<commit_message>
slide de aula HTML 27102023
</commit_message>
<xml_diff>
--- a/01 Classes/Aula03- Internet HTML - Parte 2.pptx
+++ b/01 Classes/Aula03- Internet HTML - Parte 2.pptx
@@ -5,18 +5,19 @@
     <p:sldMasterId id="2147483648" r:id="rId4"/>
   </p:sldMasterIdLst>
   <p:notesMasterIdLst>
-    <p:notesMasterId r:id="rId14"/>
+    <p:notesMasterId r:id="rId15"/>
   </p:notesMasterIdLst>
   <p:sldIdLst>
     <p:sldId id="256" r:id="rId5"/>
     <p:sldId id="1448944859" r:id="rId6"/>
     <p:sldId id="1448944863" r:id="rId7"/>
-    <p:sldId id="1448944864" r:id="rId8"/>
-    <p:sldId id="1448944853" r:id="rId9"/>
-    <p:sldId id="1448944850" r:id="rId10"/>
-    <p:sldId id="1448944858" r:id="rId11"/>
-    <p:sldId id="1448944856" r:id="rId12"/>
-    <p:sldId id="1448944862" r:id="rId13"/>
+    <p:sldId id="1448944865" r:id="rId8"/>
+    <p:sldId id="1448944864" r:id="rId9"/>
+    <p:sldId id="1448944853" r:id="rId10"/>
+    <p:sldId id="1448944850" r:id="rId11"/>
+    <p:sldId id="1448944858" r:id="rId12"/>
+    <p:sldId id="1448944856" r:id="rId13"/>
+    <p:sldId id="1448944862" r:id="rId14"/>
   </p:sldIdLst>
   <p:sldSz cx="9144000" cy="5143500" type="screen16x9"/>
   <p:notesSz cx="6858000" cy="9144000"/>
@@ -3958,7 +3959,7 @@
           </a:ln>
           <a:extLst>
             <a:ext uri="{C572A759-6A51-4108-AA02-DFA0A04FC94B}">
-              <ma14:wrappingTextBoxFlag xmlns:ma14="http://schemas.microsoft.com/office/mac/drawingml/2011/main" xmlns="" val="1"/>
+              <ma14:wrappingTextBoxFlag xmlns="" xmlns:ma14="http://schemas.microsoft.com/office/mac/drawingml/2011/main" val="1"/>
             </a:ext>
           </a:extLst>
         </p:spPr>
@@ -4007,7 +4008,7 @@
           </a:ln>
           <a:extLst>
             <a:ext uri="{C572A759-6A51-4108-AA02-DFA0A04FC94B}">
-              <ma14:wrappingTextBoxFlag xmlns:ma14="http://schemas.microsoft.com/office/mac/drawingml/2011/main" xmlns="" val="1"/>
+              <ma14:wrappingTextBoxFlag xmlns="" xmlns:ma14="http://schemas.microsoft.com/office/mac/drawingml/2011/main" val="1"/>
             </a:ext>
           </a:extLst>
         </p:spPr>
@@ -4978,7 +4979,7 @@
           </a:ln>
           <a:extLst>
             <a:ext uri="{C572A759-6A51-4108-AA02-DFA0A04FC94B}">
-              <ma14:wrappingTextBoxFlag xmlns:ma14="http://schemas.microsoft.com/office/mac/drawingml/2011/main" xmlns="" val="1"/>
+              <ma14:wrappingTextBoxFlag xmlns="" xmlns:ma14="http://schemas.microsoft.com/office/mac/drawingml/2011/main" val="1"/>
             </a:ext>
           </a:extLst>
         </p:spPr>
@@ -5295,7 +5296,7 @@
           </a:ln>
           <a:extLst>
             <a:ext uri="{C572A759-6A51-4108-AA02-DFA0A04FC94B}">
-              <ma14:wrappingTextBoxFlag xmlns:ma14="http://schemas.microsoft.com/office/mac/drawingml/2011/main" xmlns="" val="1"/>
+              <ma14:wrappingTextBoxFlag xmlns="" xmlns:ma14="http://schemas.microsoft.com/office/mac/drawingml/2011/main" val="1"/>
             </a:ext>
           </a:extLst>
         </p:spPr>
@@ -5602,6 +5603,687 @@
         </p:txBody>
       </p:sp>
     </p:spTree>
+  </p:cSld>
+  <p:clrMapOvr>
+    <a:masterClrMapping/>
+  </p:clrMapOvr>
+  <p:transition spd="med"/>
+</p:sld>
+</file>
+
+<file path=ppt/slides/slide10.xml><?xml version="1.0" encoding="utf-8"?>
+<p:sld xmlns:a="http://schemas.openxmlformats.org/drawingml/2006/main" xmlns:r="http://schemas.openxmlformats.org/officeDocument/2006/relationships" xmlns:p="http://schemas.openxmlformats.org/presentationml/2006/main">
+  <p:cSld>
+    <p:spTree>
+      <p:nvGrpSpPr>
+        <p:cNvPr id="1" name=""/>
+        <p:cNvGrpSpPr/>
+        <p:nvPr/>
+      </p:nvGrpSpPr>
+      <p:grpSpPr>
+        <a:xfrm>
+          <a:off x="0" y="0"/>
+          <a:ext cx="0" cy="0"/>
+          <a:chOff x="0" y="0"/>
+          <a:chExt cx="0" cy="0"/>
+        </a:xfrm>
+      </p:grpSpPr>
+      <p:sp>
+        <p:nvSpPr>
+          <p:cNvPr id="8" name="Title 1">
+            <a:extLst>
+              <a:ext uri="{FF2B5EF4-FFF2-40B4-BE49-F238E27FC236}">
+                <a16:creationId xmlns:a16="http://schemas.microsoft.com/office/drawing/2014/main" id="{EBCB13E4-4A11-48C5-A5A3-7FAB1396ADAB}"/>
+              </a:ext>
+            </a:extLst>
+          </p:cNvPr>
+          <p:cNvSpPr txBox="1">
+            <a:spLocks/>
+          </p:cNvSpPr>
+          <p:nvPr/>
+        </p:nvSpPr>
+        <p:spPr>
+          <a:xfrm>
+            <a:off x="442913" y="2559082"/>
+            <a:ext cx="8057620" cy="722312"/>
+          </a:xfrm>
+          <a:prstGeom prst="rect">
+            <a:avLst/>
+          </a:prstGeom>
+          <a:ln w="12700">
+            <a:miter lim="400000"/>
+          </a:ln>
+          <a:extLst>
+            <a:ext uri="{C572A759-6A51-4108-AA02-DFA0A04FC94B}">
+              <ma14:wrappingTextBoxFlag xmlns="" xmlns:ma14="http://schemas.microsoft.com/office/mac/drawingml/2011/main" val="1"/>
+            </a:ext>
+          </a:extLst>
+        </p:spPr>
+        <p:txBody>
+          <a:bodyPr lIns="45719" rIns="45719" anchor="ctr">
+            <a:noAutofit/>
+          </a:bodyPr>
+          <a:lstStyle>
+            <a:lvl1pPr marL="0" marR="0" indent="0" algn="ctr" defTabSz="457200" rtl="0" latinLnBrk="0">
+              <a:lnSpc>
+                <a:spcPct val="100000"/>
+              </a:lnSpc>
+              <a:spcBef>
+                <a:spcPts val="0"/>
+              </a:spcBef>
+              <a:spcAft>
+                <a:spcPts val="0"/>
+              </a:spcAft>
+              <a:buClrTx/>
+              <a:buSzTx/>
+              <a:buFontTx/>
+              <a:buNone/>
+              <a:tabLst/>
+              <a:defRPr sz="4400" b="0" i="0" u="none" strike="noStrike" cap="none" spc="0" baseline="0">
+                <a:ln>
+                  <a:noFill/>
+                </a:ln>
+                <a:solidFill>
+                  <a:srgbClr val="000000"/>
+                </a:solidFill>
+                <a:uFillTx/>
+                <a:latin typeface="+mj-lt"/>
+                <a:ea typeface="+mj-ea"/>
+                <a:cs typeface="+mj-cs"/>
+                <a:sym typeface="Calibri"/>
+              </a:defRPr>
+            </a:lvl1pPr>
+            <a:lvl2pPr marL="0" marR="0" indent="0" algn="ctr" defTabSz="457200" rtl="0" latinLnBrk="0">
+              <a:lnSpc>
+                <a:spcPct val="100000"/>
+              </a:lnSpc>
+              <a:spcBef>
+                <a:spcPts val="0"/>
+              </a:spcBef>
+              <a:spcAft>
+                <a:spcPts val="0"/>
+              </a:spcAft>
+              <a:buClrTx/>
+              <a:buSzTx/>
+              <a:buFontTx/>
+              <a:buNone/>
+              <a:tabLst/>
+              <a:defRPr sz="4400" b="0" i="0" u="none" strike="noStrike" cap="none" spc="0" baseline="0">
+                <a:ln>
+                  <a:noFill/>
+                </a:ln>
+                <a:solidFill>
+                  <a:srgbClr val="000000"/>
+                </a:solidFill>
+                <a:uFillTx/>
+                <a:latin typeface="+mj-lt"/>
+                <a:ea typeface="+mj-ea"/>
+                <a:cs typeface="+mj-cs"/>
+                <a:sym typeface="Calibri"/>
+              </a:defRPr>
+            </a:lvl2pPr>
+            <a:lvl3pPr marL="0" marR="0" indent="0" algn="ctr" defTabSz="457200" rtl="0" latinLnBrk="0">
+              <a:lnSpc>
+                <a:spcPct val="100000"/>
+              </a:lnSpc>
+              <a:spcBef>
+                <a:spcPts val="0"/>
+              </a:spcBef>
+              <a:spcAft>
+                <a:spcPts val="0"/>
+              </a:spcAft>
+              <a:buClrTx/>
+              <a:buSzTx/>
+              <a:buFontTx/>
+              <a:buNone/>
+              <a:tabLst/>
+              <a:defRPr sz="4400" b="0" i="0" u="none" strike="noStrike" cap="none" spc="0" baseline="0">
+                <a:ln>
+                  <a:noFill/>
+                </a:ln>
+                <a:solidFill>
+                  <a:srgbClr val="000000"/>
+                </a:solidFill>
+                <a:uFillTx/>
+                <a:latin typeface="+mj-lt"/>
+                <a:ea typeface="+mj-ea"/>
+                <a:cs typeface="+mj-cs"/>
+                <a:sym typeface="Calibri"/>
+              </a:defRPr>
+            </a:lvl3pPr>
+            <a:lvl4pPr marL="0" marR="0" indent="0" algn="ctr" defTabSz="457200" rtl="0" latinLnBrk="0">
+              <a:lnSpc>
+                <a:spcPct val="100000"/>
+              </a:lnSpc>
+              <a:spcBef>
+                <a:spcPts val="0"/>
+              </a:spcBef>
+              <a:spcAft>
+                <a:spcPts val="0"/>
+              </a:spcAft>
+              <a:buClrTx/>
+              <a:buSzTx/>
+              <a:buFontTx/>
+              <a:buNone/>
+              <a:tabLst/>
+              <a:defRPr sz="4400" b="0" i="0" u="none" strike="noStrike" cap="none" spc="0" baseline="0">
+                <a:ln>
+                  <a:noFill/>
+                </a:ln>
+                <a:solidFill>
+                  <a:srgbClr val="000000"/>
+                </a:solidFill>
+                <a:uFillTx/>
+                <a:latin typeface="+mj-lt"/>
+                <a:ea typeface="+mj-ea"/>
+                <a:cs typeface="+mj-cs"/>
+                <a:sym typeface="Calibri"/>
+              </a:defRPr>
+            </a:lvl4pPr>
+            <a:lvl5pPr marL="0" marR="0" indent="0" algn="ctr" defTabSz="457200" rtl="0" latinLnBrk="0">
+              <a:lnSpc>
+                <a:spcPct val="100000"/>
+              </a:lnSpc>
+              <a:spcBef>
+                <a:spcPts val="0"/>
+              </a:spcBef>
+              <a:spcAft>
+                <a:spcPts val="0"/>
+              </a:spcAft>
+              <a:buClrTx/>
+              <a:buSzTx/>
+              <a:buFontTx/>
+              <a:buNone/>
+              <a:tabLst/>
+              <a:defRPr sz="4400" b="0" i="0" u="none" strike="noStrike" cap="none" spc="0" baseline="0">
+                <a:ln>
+                  <a:noFill/>
+                </a:ln>
+                <a:solidFill>
+                  <a:srgbClr val="000000"/>
+                </a:solidFill>
+                <a:uFillTx/>
+                <a:latin typeface="+mj-lt"/>
+                <a:ea typeface="+mj-ea"/>
+                <a:cs typeface="+mj-cs"/>
+                <a:sym typeface="Calibri"/>
+              </a:defRPr>
+            </a:lvl5pPr>
+            <a:lvl6pPr marL="0" marR="0" indent="0" algn="ctr" defTabSz="457200" rtl="0" latinLnBrk="0">
+              <a:lnSpc>
+                <a:spcPct val="100000"/>
+              </a:lnSpc>
+              <a:spcBef>
+                <a:spcPts val="0"/>
+              </a:spcBef>
+              <a:spcAft>
+                <a:spcPts val="0"/>
+              </a:spcAft>
+              <a:buClrTx/>
+              <a:buSzTx/>
+              <a:buFontTx/>
+              <a:buNone/>
+              <a:tabLst/>
+              <a:defRPr sz="4400" b="0" i="0" u="none" strike="noStrike" cap="none" spc="0" baseline="0">
+                <a:ln>
+                  <a:noFill/>
+                </a:ln>
+                <a:solidFill>
+                  <a:srgbClr val="000000"/>
+                </a:solidFill>
+                <a:uFillTx/>
+                <a:latin typeface="+mj-lt"/>
+                <a:ea typeface="+mj-ea"/>
+                <a:cs typeface="+mj-cs"/>
+                <a:sym typeface="Calibri"/>
+              </a:defRPr>
+            </a:lvl6pPr>
+            <a:lvl7pPr marL="0" marR="0" indent="0" algn="ctr" defTabSz="457200" rtl="0" latinLnBrk="0">
+              <a:lnSpc>
+                <a:spcPct val="100000"/>
+              </a:lnSpc>
+              <a:spcBef>
+                <a:spcPts val="0"/>
+              </a:spcBef>
+              <a:spcAft>
+                <a:spcPts val="0"/>
+              </a:spcAft>
+              <a:buClrTx/>
+              <a:buSzTx/>
+              <a:buFontTx/>
+              <a:buNone/>
+              <a:tabLst/>
+              <a:defRPr sz="4400" b="0" i="0" u="none" strike="noStrike" cap="none" spc="0" baseline="0">
+                <a:ln>
+                  <a:noFill/>
+                </a:ln>
+                <a:solidFill>
+                  <a:srgbClr val="000000"/>
+                </a:solidFill>
+                <a:uFillTx/>
+                <a:latin typeface="+mj-lt"/>
+                <a:ea typeface="+mj-ea"/>
+                <a:cs typeface="+mj-cs"/>
+                <a:sym typeface="Calibri"/>
+              </a:defRPr>
+            </a:lvl7pPr>
+            <a:lvl8pPr marL="0" marR="0" indent="0" algn="ctr" defTabSz="457200" rtl="0" latinLnBrk="0">
+              <a:lnSpc>
+                <a:spcPct val="100000"/>
+              </a:lnSpc>
+              <a:spcBef>
+                <a:spcPts val="0"/>
+              </a:spcBef>
+              <a:spcAft>
+                <a:spcPts val="0"/>
+              </a:spcAft>
+              <a:buClrTx/>
+              <a:buSzTx/>
+              <a:buFontTx/>
+              <a:buNone/>
+              <a:tabLst/>
+              <a:defRPr sz="4400" b="0" i="0" u="none" strike="noStrike" cap="none" spc="0" baseline="0">
+                <a:ln>
+                  <a:noFill/>
+                </a:ln>
+                <a:solidFill>
+                  <a:srgbClr val="000000"/>
+                </a:solidFill>
+                <a:uFillTx/>
+                <a:latin typeface="+mj-lt"/>
+                <a:ea typeface="+mj-ea"/>
+                <a:cs typeface="+mj-cs"/>
+                <a:sym typeface="Calibri"/>
+              </a:defRPr>
+            </a:lvl8pPr>
+            <a:lvl9pPr marL="0" marR="0" indent="0" algn="ctr" defTabSz="457200" rtl="0" latinLnBrk="0">
+              <a:lnSpc>
+                <a:spcPct val="100000"/>
+              </a:lnSpc>
+              <a:spcBef>
+                <a:spcPts val="0"/>
+              </a:spcBef>
+              <a:spcAft>
+                <a:spcPts val="0"/>
+              </a:spcAft>
+              <a:buClrTx/>
+              <a:buSzTx/>
+              <a:buFontTx/>
+              <a:buNone/>
+              <a:tabLst/>
+              <a:defRPr sz="4400" b="0" i="0" u="none" strike="noStrike" cap="none" spc="0" baseline="0">
+                <a:ln>
+                  <a:noFill/>
+                </a:ln>
+                <a:solidFill>
+                  <a:srgbClr val="000000"/>
+                </a:solidFill>
+                <a:uFillTx/>
+                <a:latin typeface="+mj-lt"/>
+                <a:ea typeface="+mj-ea"/>
+                <a:cs typeface="+mj-cs"/>
+                <a:sym typeface="Calibri"/>
+              </a:defRPr>
+            </a:lvl9pPr>
+          </a:lstStyle>
+          <a:p>
+            <a:pPr algn="l" defTabSz="265175" hangingPunct="1">
+              <a:defRPr sz="2262">
+                <a:solidFill>
+                  <a:srgbClr val="FFFFFF"/>
+                </a:solidFill>
+              </a:defRPr>
+            </a:pPr>
+            <a:r>
+              <a:rPr lang="pt-BR" sz="3200" b="1" dirty="0">
+                <a:solidFill>
+                  <a:schemeClr val="bg1"/>
+                </a:solidFill>
+              </a:rPr>
+              <a:t>NID – Fundamentação: Tópicos em Informática</a:t>
+            </a:r>
+          </a:p>
+        </p:txBody>
+      </p:sp>
+      <p:sp>
+        <p:nvSpPr>
+          <p:cNvPr id="2" name="Title 1">
+            <a:extLst>
+              <a:ext uri="{FF2B5EF4-FFF2-40B4-BE49-F238E27FC236}">
+                <a16:creationId xmlns:a16="http://schemas.microsoft.com/office/drawing/2014/main" id="{FD974EFB-1823-854F-EADA-689E053E3A06}"/>
+              </a:ext>
+            </a:extLst>
+          </p:cNvPr>
+          <p:cNvSpPr txBox="1">
+            <a:spLocks/>
+          </p:cNvSpPr>
+          <p:nvPr/>
+        </p:nvSpPr>
+        <p:spPr>
+          <a:xfrm>
+            <a:off x="4319197" y="4511164"/>
+            <a:ext cx="3515292" cy="493349"/>
+          </a:xfrm>
+          <a:prstGeom prst="rect">
+            <a:avLst/>
+          </a:prstGeom>
+          <a:ln w="12700">
+            <a:miter lim="400000"/>
+          </a:ln>
+          <a:extLst>
+            <a:ext uri="{C572A759-6A51-4108-AA02-DFA0A04FC94B}">
+              <ma14:wrappingTextBoxFlag xmlns="" xmlns:ma14="http://schemas.microsoft.com/office/mac/drawingml/2011/main" val="1"/>
+            </a:ext>
+          </a:extLst>
+        </p:spPr>
+        <p:txBody>
+          <a:bodyPr lIns="45719" rIns="45719" anchor="ctr">
+            <a:normAutofit/>
+          </a:bodyPr>
+          <a:lstStyle>
+            <a:lvl1pPr marL="0" marR="0" indent="0" algn="ctr" defTabSz="457200" rtl="0" latinLnBrk="0">
+              <a:lnSpc>
+                <a:spcPct val="100000"/>
+              </a:lnSpc>
+              <a:spcBef>
+                <a:spcPts val="0"/>
+              </a:spcBef>
+              <a:spcAft>
+                <a:spcPts val="0"/>
+              </a:spcAft>
+              <a:buClrTx/>
+              <a:buSzTx/>
+              <a:buFontTx/>
+              <a:buNone/>
+              <a:tabLst/>
+              <a:defRPr sz="4400" b="0" i="0" u="none" strike="noStrike" cap="none" spc="0" baseline="0">
+                <a:ln>
+                  <a:noFill/>
+                </a:ln>
+                <a:solidFill>
+                  <a:srgbClr val="000000"/>
+                </a:solidFill>
+                <a:uFillTx/>
+                <a:latin typeface="+mj-lt"/>
+                <a:ea typeface="+mj-ea"/>
+                <a:cs typeface="+mj-cs"/>
+                <a:sym typeface="Calibri"/>
+              </a:defRPr>
+            </a:lvl1pPr>
+            <a:lvl2pPr marL="0" marR="0" indent="0" algn="ctr" defTabSz="457200" rtl="0" latinLnBrk="0">
+              <a:lnSpc>
+                <a:spcPct val="100000"/>
+              </a:lnSpc>
+              <a:spcBef>
+                <a:spcPts val="0"/>
+              </a:spcBef>
+              <a:spcAft>
+                <a:spcPts val="0"/>
+              </a:spcAft>
+              <a:buClrTx/>
+              <a:buSzTx/>
+              <a:buFontTx/>
+              <a:buNone/>
+              <a:tabLst/>
+              <a:defRPr sz="4400" b="0" i="0" u="none" strike="noStrike" cap="none" spc="0" baseline="0">
+                <a:ln>
+                  <a:noFill/>
+                </a:ln>
+                <a:solidFill>
+                  <a:srgbClr val="000000"/>
+                </a:solidFill>
+                <a:uFillTx/>
+                <a:latin typeface="+mj-lt"/>
+                <a:ea typeface="+mj-ea"/>
+                <a:cs typeface="+mj-cs"/>
+                <a:sym typeface="Calibri"/>
+              </a:defRPr>
+            </a:lvl2pPr>
+            <a:lvl3pPr marL="0" marR="0" indent="0" algn="ctr" defTabSz="457200" rtl="0" latinLnBrk="0">
+              <a:lnSpc>
+                <a:spcPct val="100000"/>
+              </a:lnSpc>
+              <a:spcBef>
+                <a:spcPts val="0"/>
+              </a:spcBef>
+              <a:spcAft>
+                <a:spcPts val="0"/>
+              </a:spcAft>
+              <a:buClrTx/>
+              <a:buSzTx/>
+              <a:buFontTx/>
+              <a:buNone/>
+              <a:tabLst/>
+              <a:defRPr sz="4400" b="0" i="0" u="none" strike="noStrike" cap="none" spc="0" baseline="0">
+                <a:ln>
+                  <a:noFill/>
+                </a:ln>
+                <a:solidFill>
+                  <a:srgbClr val="000000"/>
+                </a:solidFill>
+                <a:uFillTx/>
+                <a:latin typeface="+mj-lt"/>
+                <a:ea typeface="+mj-ea"/>
+                <a:cs typeface="+mj-cs"/>
+                <a:sym typeface="Calibri"/>
+              </a:defRPr>
+            </a:lvl3pPr>
+            <a:lvl4pPr marL="0" marR="0" indent="0" algn="ctr" defTabSz="457200" rtl="0" latinLnBrk="0">
+              <a:lnSpc>
+                <a:spcPct val="100000"/>
+              </a:lnSpc>
+              <a:spcBef>
+                <a:spcPts val="0"/>
+              </a:spcBef>
+              <a:spcAft>
+                <a:spcPts val="0"/>
+              </a:spcAft>
+              <a:buClrTx/>
+              <a:buSzTx/>
+              <a:buFontTx/>
+              <a:buNone/>
+              <a:tabLst/>
+              <a:defRPr sz="4400" b="0" i="0" u="none" strike="noStrike" cap="none" spc="0" baseline="0">
+                <a:ln>
+                  <a:noFill/>
+                </a:ln>
+                <a:solidFill>
+                  <a:srgbClr val="000000"/>
+                </a:solidFill>
+                <a:uFillTx/>
+                <a:latin typeface="+mj-lt"/>
+                <a:ea typeface="+mj-ea"/>
+                <a:cs typeface="+mj-cs"/>
+                <a:sym typeface="Calibri"/>
+              </a:defRPr>
+            </a:lvl4pPr>
+            <a:lvl5pPr marL="0" marR="0" indent="0" algn="ctr" defTabSz="457200" rtl="0" latinLnBrk="0">
+              <a:lnSpc>
+                <a:spcPct val="100000"/>
+              </a:lnSpc>
+              <a:spcBef>
+                <a:spcPts val="0"/>
+              </a:spcBef>
+              <a:spcAft>
+                <a:spcPts val="0"/>
+              </a:spcAft>
+              <a:buClrTx/>
+              <a:buSzTx/>
+              <a:buFontTx/>
+              <a:buNone/>
+              <a:tabLst/>
+              <a:defRPr sz="4400" b="0" i="0" u="none" strike="noStrike" cap="none" spc="0" baseline="0">
+                <a:ln>
+                  <a:noFill/>
+                </a:ln>
+                <a:solidFill>
+                  <a:srgbClr val="000000"/>
+                </a:solidFill>
+                <a:uFillTx/>
+                <a:latin typeface="+mj-lt"/>
+                <a:ea typeface="+mj-ea"/>
+                <a:cs typeface="+mj-cs"/>
+                <a:sym typeface="Calibri"/>
+              </a:defRPr>
+            </a:lvl5pPr>
+            <a:lvl6pPr marL="0" marR="0" indent="0" algn="ctr" defTabSz="457200" rtl="0" latinLnBrk="0">
+              <a:lnSpc>
+                <a:spcPct val="100000"/>
+              </a:lnSpc>
+              <a:spcBef>
+                <a:spcPts val="0"/>
+              </a:spcBef>
+              <a:spcAft>
+                <a:spcPts val="0"/>
+              </a:spcAft>
+              <a:buClrTx/>
+              <a:buSzTx/>
+              <a:buFontTx/>
+              <a:buNone/>
+              <a:tabLst/>
+              <a:defRPr sz="4400" b="0" i="0" u="none" strike="noStrike" cap="none" spc="0" baseline="0">
+                <a:ln>
+                  <a:noFill/>
+                </a:ln>
+                <a:solidFill>
+                  <a:srgbClr val="000000"/>
+                </a:solidFill>
+                <a:uFillTx/>
+                <a:latin typeface="+mj-lt"/>
+                <a:ea typeface="+mj-ea"/>
+                <a:cs typeface="+mj-cs"/>
+                <a:sym typeface="Calibri"/>
+              </a:defRPr>
+            </a:lvl6pPr>
+            <a:lvl7pPr marL="0" marR="0" indent="0" algn="ctr" defTabSz="457200" rtl="0" latinLnBrk="0">
+              <a:lnSpc>
+                <a:spcPct val="100000"/>
+              </a:lnSpc>
+              <a:spcBef>
+                <a:spcPts val="0"/>
+              </a:spcBef>
+              <a:spcAft>
+                <a:spcPts val="0"/>
+              </a:spcAft>
+              <a:buClrTx/>
+              <a:buSzTx/>
+              <a:buFontTx/>
+              <a:buNone/>
+              <a:tabLst/>
+              <a:defRPr sz="4400" b="0" i="0" u="none" strike="noStrike" cap="none" spc="0" baseline="0">
+                <a:ln>
+                  <a:noFill/>
+                </a:ln>
+                <a:solidFill>
+                  <a:srgbClr val="000000"/>
+                </a:solidFill>
+                <a:uFillTx/>
+                <a:latin typeface="+mj-lt"/>
+                <a:ea typeface="+mj-ea"/>
+                <a:cs typeface="+mj-cs"/>
+                <a:sym typeface="Calibri"/>
+              </a:defRPr>
+            </a:lvl7pPr>
+            <a:lvl8pPr marL="0" marR="0" indent="0" algn="ctr" defTabSz="457200" rtl="0" latinLnBrk="0">
+              <a:lnSpc>
+                <a:spcPct val="100000"/>
+              </a:lnSpc>
+              <a:spcBef>
+                <a:spcPts val="0"/>
+              </a:spcBef>
+              <a:spcAft>
+                <a:spcPts val="0"/>
+              </a:spcAft>
+              <a:buClrTx/>
+              <a:buSzTx/>
+              <a:buFontTx/>
+              <a:buNone/>
+              <a:tabLst/>
+              <a:defRPr sz="4400" b="0" i="0" u="none" strike="noStrike" cap="none" spc="0" baseline="0">
+                <a:ln>
+                  <a:noFill/>
+                </a:ln>
+                <a:solidFill>
+                  <a:srgbClr val="000000"/>
+                </a:solidFill>
+                <a:uFillTx/>
+                <a:latin typeface="+mj-lt"/>
+                <a:ea typeface="+mj-ea"/>
+                <a:cs typeface="+mj-cs"/>
+                <a:sym typeface="Calibri"/>
+              </a:defRPr>
+            </a:lvl8pPr>
+            <a:lvl9pPr marL="0" marR="0" indent="0" algn="ctr" defTabSz="457200" rtl="0" latinLnBrk="0">
+              <a:lnSpc>
+                <a:spcPct val="100000"/>
+              </a:lnSpc>
+              <a:spcBef>
+                <a:spcPts val="0"/>
+              </a:spcBef>
+              <a:spcAft>
+                <a:spcPts val="0"/>
+              </a:spcAft>
+              <a:buClrTx/>
+              <a:buSzTx/>
+              <a:buFontTx/>
+              <a:buNone/>
+              <a:tabLst/>
+              <a:defRPr sz="4400" b="0" i="0" u="none" strike="noStrike" cap="none" spc="0" baseline="0">
+                <a:ln>
+                  <a:noFill/>
+                </a:ln>
+                <a:solidFill>
+                  <a:srgbClr val="000000"/>
+                </a:solidFill>
+                <a:uFillTx/>
+                <a:latin typeface="+mj-lt"/>
+                <a:ea typeface="+mj-ea"/>
+                <a:cs typeface="+mj-cs"/>
+                <a:sym typeface="Calibri"/>
+              </a:defRPr>
+            </a:lvl9pPr>
+          </a:lstStyle>
+          <a:p>
+            <a:pPr algn="l" defTabSz="265175" hangingPunct="1">
+              <a:defRPr sz="2262">
+                <a:solidFill>
+                  <a:srgbClr val="FFFFFF"/>
+                </a:solidFill>
+              </a:defRPr>
+            </a:pPr>
+            <a:r>
+              <a:rPr lang="pt-BR" sz="2000" b="1" dirty="0">
+                <a:solidFill>
+                  <a:schemeClr val="bg1"/>
+                </a:solidFill>
+              </a:rPr>
+              <a:t>Professor: </a:t>
+            </a:r>
+            <a:r>
+              <a:rPr lang="pt-BR" sz="2000" b="1" dirty="0" err="1">
+                <a:solidFill>
+                  <a:schemeClr val="bg1"/>
+                </a:solidFill>
+              </a:rPr>
+              <a:t>MSc</a:t>
+            </a:r>
+            <a:r>
+              <a:rPr lang="pt-BR" sz="2000" b="1" dirty="0">
+                <a:solidFill>
+                  <a:schemeClr val="bg1"/>
+                </a:solidFill>
+              </a:rPr>
+              <a:t> Heleno Cardoso </a:t>
+            </a:r>
+          </a:p>
+        </p:txBody>
+      </p:sp>
+    </p:spTree>
+    <p:extLst>
+      <p:ext uri="{BB962C8B-B14F-4D97-AF65-F5344CB8AC3E}">
+        <p14:creationId xmlns:p14="http://schemas.microsoft.com/office/powerpoint/2010/main" val="1100631195"/>
+      </p:ext>
+    </p:extLst>
   </p:cSld>
   <p:clrMapOvr>
     <a:masterClrMapping/>
@@ -5654,7 +6336,7 @@
           </a:ln>
           <a:extLst>
             <a:ext uri="{C572A759-6A51-4108-AA02-DFA0A04FC94B}">
-              <ma14:wrappingTextBoxFlag xmlns:ma14="http://schemas.microsoft.com/office/mac/drawingml/2011/main" xmlns="" val="1"/>
+              <ma14:wrappingTextBoxFlag xmlns="" xmlns:ma14="http://schemas.microsoft.com/office/mac/drawingml/2011/main" val="1"/>
             </a:ext>
           </a:extLst>
         </p:spPr>
@@ -5971,7 +6653,7 @@
           </a:ln>
           <a:extLst>
             <a:ext uri="{C572A759-6A51-4108-AA02-DFA0A04FC94B}">
-              <ma14:wrappingTextBoxFlag xmlns:ma14="http://schemas.microsoft.com/office/mac/drawingml/2011/main" xmlns="" val="1"/>
+              <ma14:wrappingTextBoxFlag xmlns="" xmlns:ma14="http://schemas.microsoft.com/office/mac/drawingml/2011/main" val="1"/>
             </a:ext>
           </a:extLst>
         </p:spPr>
@@ -6358,7 +7040,7 @@
         <p:spPr>
           <a:xfrm>
             <a:off x="382902" y="1236825"/>
-            <a:ext cx="7745097" cy="3416320"/>
+            <a:ext cx="7745097" cy="3785652"/>
           </a:xfrm>
           <a:prstGeom prst="rect">
             <a:avLst/>
@@ -6392,86 +7074,7 @@
             <a:pPr algn="just"/>
             <a:r>
               <a:rPr lang="pt-BR" sz="2400" b="1" dirty="0"/>
-              <a:t>IDE</a:t>
-            </a:r>
-            <a:r>
-              <a:rPr lang="pt-BR" sz="2400" dirty="0"/>
-              <a:t>: </a:t>
-            </a:r>
-            <a:r>
-              <a:rPr lang="pt-BR" sz="2400" b="1" dirty="0" err="1">
-                <a:solidFill>
-                  <a:srgbClr val="FF0000"/>
-                </a:solidFill>
-              </a:rPr>
-              <a:t>VSCode</a:t>
-            </a:r>
-            <a:endParaRPr lang="pt-BR" sz="2400" b="1" dirty="0">
-              <a:solidFill>
-                <a:srgbClr val="FF0000"/>
-              </a:solidFill>
-            </a:endParaRPr>
-          </a:p>
-          <a:p>
-            <a:pPr algn="just"/>
-            <a:r>
-              <a:rPr lang="pt-BR" sz="2400" b="1" dirty="0"/>
-              <a:t>Estudo: </a:t>
-            </a:r>
-            <a:r>
-              <a:rPr lang="pt-BR" sz="2400" dirty="0">
-                <a:hlinkClick r:id="rId2"/>
-              </a:rPr>
-              <a:t>https://www.w3schools.com/html/</a:t>
-            </a:r>
-            <a:endParaRPr lang="pt-BR" sz="2400" dirty="0"/>
-          </a:p>
-          <a:p>
-            <a:pPr algn="just"/>
-            <a:endParaRPr lang="pt-BR" sz="2400" dirty="0"/>
-          </a:p>
-          <a:p>
-            <a:pPr algn="just"/>
-            <a:r>
-              <a:rPr lang="pt-BR" sz="2400" dirty="0"/>
-              <a:t>	</a:t>
-            </a:r>
-            <a:r>
-              <a:rPr lang="pt-BR" sz="2400" dirty="0">
-                <a:hlinkClick r:id="rId3"/>
-              </a:rPr>
-              <a:t>https://juliabritocardoso.netlify.app/</a:t>
-            </a:r>
-            <a:r>
-              <a:rPr lang="pt-BR" sz="2400" dirty="0"/>
-              <a:t> (</a:t>
-            </a:r>
-            <a:r>
-              <a:rPr lang="pt-BR" sz="2400" b="1" dirty="0"/>
-              <a:t>exemplo</a:t>
-            </a:r>
-            <a:r>
-              <a:rPr lang="pt-BR" sz="2400" dirty="0"/>
-              <a:t>)</a:t>
-            </a:r>
-          </a:p>
-          <a:p>
-            <a:pPr algn="just"/>
-            <a:endParaRPr lang="pt-BR" sz="2400" dirty="0"/>
-          </a:p>
-          <a:p>
-            <a:pPr algn="just"/>
-            <a:r>
-              <a:rPr lang="pt-BR" sz="2400" dirty="0"/>
-              <a:t>=&gt; </a:t>
-            </a:r>
-            <a:r>
-              <a:rPr lang="pt-BR" sz="2400" b="1" dirty="0" err="1"/>
-              <a:t>Tags</a:t>
-            </a:r>
-            <a:r>
-              <a:rPr lang="pt-BR" sz="2400" dirty="0"/>
-              <a:t> e </a:t>
+              <a:t>Página Web (</a:t>
             </a:r>
             <a:r>
               <a:rPr lang="pt-BR" sz="2400" b="1" dirty="0">
@@ -6479,54 +7082,31 @@
                   <a:srgbClr val="FF0000"/>
                 </a:solidFill>
               </a:rPr>
-              <a:t>Atributos</a:t>
-            </a:r>
+              <a:t>Estrutura</a:t>
+            </a:r>
+            <a:r>
+              <a:rPr lang="pt-BR" sz="2400" b="1" dirty="0"/>
+              <a:t>)</a:t>
+            </a:r>
+            <a:endParaRPr lang="pt-BR" sz="2400" dirty="0"/>
           </a:p>
           <a:p>
             <a:pPr algn="just"/>
+            <a:endParaRPr lang="pt-BR" sz="2400" dirty="0"/>
+          </a:p>
+          <a:p>
+            <a:pPr algn="just"/>
             <a:r>
               <a:rPr lang="pt-BR" sz="2400" dirty="0"/>
-              <a:t>	h1; p; </a:t>
-            </a:r>
-            <a:r>
-              <a:rPr lang="pt-BR" sz="2400" dirty="0" err="1"/>
-              <a:t>tr</a:t>
+              <a:t>	1. </a:t>
+            </a:r>
+            <a:r>
+              <a:rPr lang="pt-BR" sz="2400" b="1" dirty="0"/>
+              <a:t>HTML</a:t>
             </a:r>
             <a:r>
               <a:rPr lang="pt-BR" sz="2400" dirty="0"/>
-              <a:t>; </a:t>
-            </a:r>
-            <a:r>
-              <a:rPr lang="pt-BR" sz="2400" dirty="0" err="1"/>
-              <a:t>br</a:t>
-            </a:r>
-            <a:r>
-              <a:rPr lang="pt-BR" sz="2400" dirty="0"/>
-              <a:t>; </a:t>
-            </a:r>
-            <a:r>
-              <a:rPr lang="pt-BR" sz="2400" dirty="0" err="1"/>
-              <a:t>ul</a:t>
-            </a:r>
-            <a:r>
-              <a:rPr lang="pt-BR" sz="2400" dirty="0"/>
-              <a:t>/li; </a:t>
-            </a:r>
-            <a:r>
-              <a:rPr lang="pt-BR" sz="2400" dirty="0" err="1"/>
-              <a:t>ol</a:t>
-            </a:r>
-            <a:r>
-              <a:rPr lang="pt-BR" sz="2400" dirty="0"/>
-              <a:t>/li; a/</a:t>
-            </a:r>
-            <a:r>
-              <a:rPr lang="pt-BR" sz="2400" b="1" dirty="0" err="1">
-                <a:solidFill>
-                  <a:srgbClr val="FF0000"/>
-                </a:solidFill>
-              </a:rPr>
-              <a:t>href</a:t>
+              <a:t> – Informação (</a:t>
             </a:r>
             <a:r>
               <a:rPr lang="pt-BR" sz="2400" b="1" dirty="0">
@@ -6534,27 +7114,26 @@
                   <a:srgbClr val="FF0000"/>
                 </a:solidFill>
               </a:rPr>
-              <a:t>/target</a:t>
+              <a:t>Conteúdo</a:t>
             </a:r>
             <a:r>
               <a:rPr lang="pt-BR" sz="2400" dirty="0"/>
-              <a:t>; </a:t>
-            </a:r>
-            <a:r>
-              <a:rPr lang="pt-BR" sz="2400" dirty="0" err="1"/>
-              <a:t>img</a:t>
-            </a:r>
+              <a:t>)</a:t>
+            </a:r>
+          </a:p>
+          <a:p>
+            <a:pPr algn="just"/>
             <a:r>
               <a:rPr lang="pt-BR" sz="2400" dirty="0"/>
-              <a:t>/</a:t>
-            </a:r>
-            <a:r>
-              <a:rPr lang="pt-BR" sz="2400" b="1" dirty="0" err="1">
-                <a:solidFill>
-                  <a:srgbClr val="FF0000"/>
-                </a:solidFill>
-              </a:rPr>
-              <a:t>src</a:t>
+              <a:t>	2. </a:t>
+            </a:r>
+            <a:r>
+              <a:rPr lang="pt-BR" sz="2400" b="1" dirty="0"/>
+              <a:t>CSS</a:t>
+            </a:r>
+            <a:r>
+              <a:rPr lang="pt-BR" sz="2400" dirty="0"/>
+              <a:t> – Estilização (</a:t>
             </a:r>
             <a:r>
               <a:rPr lang="pt-BR" sz="2400" b="1" dirty="0">
@@ -6562,116 +7141,133 @@
                   <a:srgbClr val="FF0000"/>
                 </a:solidFill>
               </a:rPr>
-              <a:t>/</a:t>
-            </a:r>
-            <a:r>
-              <a:rPr lang="pt-BR" sz="2400" b="1" dirty="0" err="1">
+              <a:t>Visual/Apresentação</a:t>
+            </a:r>
+            <a:r>
+              <a:rPr lang="pt-BR" sz="2400" dirty="0"/>
+              <a:t>)</a:t>
+            </a:r>
+          </a:p>
+          <a:p>
+            <a:pPr algn="just"/>
+            <a:r>
+              <a:rPr lang="pt-BR" sz="2400" dirty="0"/>
+              <a:t>	3. </a:t>
+            </a:r>
+            <a:r>
+              <a:rPr lang="pt-BR" sz="2400" b="1" dirty="0"/>
+              <a:t>JS</a:t>
+            </a:r>
+            <a:r>
+              <a:rPr lang="pt-BR" sz="2400" dirty="0"/>
+              <a:t> – Validação (</a:t>
+            </a:r>
+            <a:r>
+              <a:rPr lang="pt-BR" sz="2400" b="1" dirty="0">
                 <a:solidFill>
                   <a:srgbClr val="FF0000"/>
                 </a:solidFill>
               </a:rPr>
-              <a:t>alt</a:t>
+              <a:t>Comportamento</a:t>
             </a:r>
             <a:r>
               <a:rPr lang="pt-BR" sz="2400" dirty="0"/>
-              <a:t>; figure/</a:t>
-            </a:r>
-            <a:r>
-              <a:rPr lang="pt-BR" sz="2400" dirty="0" err="1"/>
-              <a:t>img</a:t>
-            </a:r>
+              <a:t>)</a:t>
+            </a:r>
+          </a:p>
+          <a:p>
+            <a:pPr algn="just"/>
+            <a:endParaRPr lang="pt-BR" sz="2400" dirty="0"/>
+          </a:p>
+          <a:p>
+            <a:pPr algn="just"/>
             <a:r>
               <a:rPr lang="pt-BR" sz="2400" dirty="0"/>
-              <a:t>/</a:t>
-            </a:r>
-            <a:r>
-              <a:rPr lang="pt-BR" sz="2400" dirty="0" err="1"/>
-              <a:t>figcaption</a:t>
+              <a:t>-- </a:t>
+            </a:r>
+            <a:r>
+              <a:rPr lang="pt-BR" sz="2400" b="1" dirty="0"/>
+              <a:t>Páginas Web </a:t>
             </a:r>
             <a:r>
               <a:rPr lang="pt-BR" sz="2400" dirty="0"/>
-              <a:t>; </a:t>
-            </a:r>
-            <a:r>
-              <a:rPr lang="pt-BR" sz="2400" dirty="0" err="1"/>
-              <a:t>strong</a:t>
-            </a:r>
-            <a:r>
-              <a:rPr lang="pt-BR" sz="2400" dirty="0"/>
-              <a:t>; i; </a:t>
-            </a:r>
-            <a:r>
-              <a:rPr lang="pt-BR" sz="2400" dirty="0" err="1"/>
-              <a:t>sup</a:t>
-            </a:r>
-            <a:r>
-              <a:rPr lang="pt-BR" sz="2400" dirty="0"/>
-              <a:t>; header; </a:t>
-            </a:r>
-            <a:r>
-              <a:rPr lang="pt-BR" sz="2400" dirty="0" err="1"/>
-              <a:t>footer</a:t>
-            </a:r>
-            <a:r>
-              <a:rPr lang="pt-BR" sz="2400" dirty="0"/>
-              <a:t>; </a:t>
-            </a:r>
-            <a:r>
-              <a:rPr lang="pt-BR" sz="2400" dirty="0" err="1"/>
-              <a:t>section</a:t>
-            </a:r>
-            <a:r>
-              <a:rPr lang="pt-BR" sz="2400" dirty="0"/>
-              <a:t>; </a:t>
-            </a:r>
-            <a:r>
-              <a:rPr lang="pt-BR" sz="2400" dirty="0" err="1"/>
-              <a:t>aside</a:t>
-            </a:r>
-            <a:r>
-              <a:rPr lang="pt-BR" sz="2400" dirty="0"/>
-              <a:t>; </a:t>
-            </a:r>
-            <a:r>
-              <a:rPr lang="pt-BR" sz="2400" dirty="0" err="1"/>
-              <a:t>div</a:t>
-            </a:r>
-            <a:r>
-              <a:rPr lang="pt-BR" sz="2400" dirty="0"/>
-              <a:t>; </a:t>
-            </a:r>
-            <a:r>
-              <a:rPr lang="pt-BR" sz="2400" dirty="0" err="1"/>
-              <a:t>nav</a:t>
-            </a:r>
-            <a:r>
-              <a:rPr lang="pt-BR" sz="2400" dirty="0"/>
-              <a:t>; </a:t>
-            </a:r>
-            <a:r>
-              <a:rPr lang="pt-BR" sz="2400" dirty="0" err="1"/>
-              <a:t>table</a:t>
-            </a:r>
-            <a:r>
-              <a:rPr lang="pt-BR" sz="2400" dirty="0"/>
-              <a:t>; </a:t>
-            </a:r>
-            <a:r>
-              <a:rPr lang="pt-BR" sz="2400" dirty="0" err="1"/>
-              <a:t>form</a:t>
-            </a:r>
-            <a:r>
-              <a:rPr lang="pt-BR" sz="2400" dirty="0"/>
-              <a:t>/</a:t>
-            </a:r>
-            <a:r>
-              <a:rPr lang="pt-BR" sz="2400" dirty="0">
+              <a:t>(</a:t>
+            </a:r>
+            <a:r>
+              <a:rPr lang="pt-BR" sz="2400" b="1" dirty="0">
                 <a:solidFill>
-                  <a:schemeClr val="tx1"/>
+                  <a:srgbClr val="FF0000"/>
                 </a:solidFill>
               </a:rPr>
-              <a:t>input</a:t>
-            </a:r>
+              <a:t>Exemplos</a:t>
+            </a:r>
+            <a:r>
+              <a:rPr lang="pt-BR" sz="2400" dirty="0"/>
+              <a:t>)</a:t>
+            </a:r>
+          </a:p>
+          <a:p>
+            <a:pPr algn="just"/>
+            <a:r>
+              <a:rPr lang="pt-BR" sz="2400" dirty="0"/>
+              <a:t>	</a:t>
+            </a:r>
+            <a:r>
+              <a:rPr lang="pt-BR" sz="2400" dirty="0">
+                <a:hlinkClick r:id="rId2"/>
+              </a:rPr>
+              <a:t>https://juliabritocardoso.netlify.app/</a:t>
+            </a:r>
+            <a:r>
+              <a:rPr lang="pt-BR" sz="2400" dirty="0"/>
+              <a:t> (</a:t>
+            </a:r>
+            <a:r>
+              <a:rPr lang="pt-BR" sz="2400" b="1" dirty="0"/>
+              <a:t>Ex1.: </a:t>
+            </a:r>
+            <a:r>
+              <a:rPr lang="pt-BR" sz="2400" b="1" dirty="0" err="1"/>
+              <a:t>Juju</a:t>
+            </a:r>
+            <a:r>
+              <a:rPr lang="pt-BR" sz="2400" dirty="0"/>
+              <a:t>)</a:t>
+            </a:r>
+          </a:p>
+          <a:p>
+            <a:pPr algn="just"/>
+            <a:r>
+              <a:rPr lang="pt-BR" sz="2400" dirty="0"/>
+              <a:t>	</a:t>
+            </a:r>
+            <a:r>
+              <a:rPr lang="pt-BR" sz="2400" dirty="0">
+                <a:hlinkClick r:id="rId3"/>
+              </a:rPr>
+              <a:t>https://candid-tulumba-3b31b0.netlify.app</a:t>
+            </a:r>
+            <a:r>
+              <a:rPr lang="pt-BR" sz="2400" dirty="0">
+                <a:hlinkClick r:id="rId3"/>
+              </a:rPr>
+              <a:t>/</a:t>
+            </a:r>
+            <a:r>
+              <a:rPr lang="pt-BR" sz="2400" dirty="0"/>
+              <a:t> (</a:t>
+            </a:r>
+            <a:r>
+              <a:rPr lang="pt-BR" sz="2400" b="1" dirty="0"/>
+              <a:t>Ex2.: Leo</a:t>
+            </a:r>
+            <a:r>
+              <a:rPr lang="pt-BR" sz="2400" dirty="0"/>
+              <a:t>)</a:t>
+            </a:r>
+          </a:p>
+          <a:p>
+            <a:pPr algn="just"/>
             <a:endParaRPr lang="pt-BR" sz="2400" dirty="0"/>
           </a:p>
         </p:txBody>
@@ -6773,7 +7369,7 @@
         <p:spPr>
           <a:xfrm>
             <a:off x="382902" y="1236825"/>
-            <a:ext cx="7745097" cy="1384995"/>
+            <a:ext cx="7745097" cy="3816429"/>
           </a:xfrm>
           <a:prstGeom prst="rect">
             <a:avLst/>
@@ -6806,45 +7402,337 @@
           <a:p>
             <a:pPr algn="just"/>
             <a:r>
-              <a:rPr lang="pt-BR" sz="2800" dirty="0"/>
-              <a:t>=&gt; </a:t>
-            </a:r>
-            <a:r>
-              <a:rPr lang="pt-BR" sz="2800" b="1" dirty="0" err="1"/>
-              <a:t>Tags</a:t>
-            </a:r>
-            <a:endParaRPr lang="pt-BR" sz="2800" b="1" dirty="0"/>
-          </a:p>
-          <a:p>
-            <a:pPr algn="just"/>
-            <a:endParaRPr lang="pt-BR" sz="2800" dirty="0"/>
-          </a:p>
-          <a:p>
-            <a:pPr algn="just"/>
-            <a:r>
-              <a:rPr lang="pt-BR" sz="2800" dirty="0"/>
-              <a:t>      					</a:t>
-            </a:r>
-            <a:r>
-              <a:rPr lang="pt-BR" sz="2800" b="1" dirty="0" err="1">
+              <a:rPr lang="pt-BR" sz="2200" b="1" dirty="0"/>
+              <a:t>IDE</a:t>
+            </a:r>
+            <a:r>
+              <a:rPr lang="pt-BR" sz="2200" dirty="0"/>
+              <a:t>: </a:t>
+            </a:r>
+            <a:r>
+              <a:rPr lang="pt-BR" sz="2200" b="1" dirty="0" err="1">
                 <a:solidFill>
                   <a:srgbClr val="FF0000"/>
                 </a:solidFill>
               </a:rPr>
-              <a:t>Bootstrap</a:t>
-            </a:r>
-            <a:endParaRPr lang="pt-BR" sz="2800" b="1" dirty="0">
+              <a:t>VSCode</a:t>
+            </a:r>
+            <a:endParaRPr lang="pt-BR" sz="2200" b="1" dirty="0">
               <a:solidFill>
                 <a:srgbClr val="FF0000"/>
               </a:solidFill>
             </a:endParaRPr>
+          </a:p>
+          <a:p>
+            <a:pPr algn="just"/>
+            <a:r>
+              <a:rPr lang="pt-BR" sz="2200" dirty="0"/>
+              <a:t>=&gt; </a:t>
+            </a:r>
+            <a:r>
+              <a:rPr lang="pt-BR" sz="2200" b="1" dirty="0" err="1"/>
+              <a:t>Tags</a:t>
+            </a:r>
+            <a:r>
+              <a:rPr lang="pt-BR" sz="2200" dirty="0"/>
+              <a:t> e </a:t>
+            </a:r>
+            <a:r>
+              <a:rPr lang="pt-BR" sz="2200" b="1" dirty="0">
+                <a:solidFill>
+                  <a:srgbClr val="FF0000"/>
+                </a:solidFill>
+              </a:rPr>
+              <a:t>Atributos</a:t>
+            </a:r>
+          </a:p>
+          <a:p>
+            <a:pPr algn="just"/>
+            <a:r>
+              <a:rPr lang="pt-BR" sz="2200" dirty="0"/>
+              <a:t>	1. h1-h6; p; </a:t>
+            </a:r>
+            <a:r>
+              <a:rPr lang="pt-BR" sz="2200" dirty="0" err="1"/>
+              <a:t>strong</a:t>
+            </a:r>
+            <a:r>
+              <a:rPr lang="pt-BR" sz="2200" dirty="0"/>
+              <a:t>; i; </a:t>
+            </a:r>
+            <a:r>
+              <a:rPr lang="pt-BR" sz="2200" dirty="0" err="1"/>
+              <a:t>sup</a:t>
+            </a:r>
+            <a:r>
+              <a:rPr lang="pt-BR" sz="2200" dirty="0"/>
+              <a:t>; </a:t>
+            </a:r>
+            <a:r>
+              <a:rPr lang="pt-BR" sz="2200" dirty="0" err="1"/>
+              <a:t>tr</a:t>
+            </a:r>
+            <a:r>
+              <a:rPr lang="pt-BR" sz="2200" dirty="0"/>
+              <a:t>; </a:t>
+            </a:r>
+            <a:r>
+              <a:rPr lang="pt-BR" sz="2200" dirty="0" err="1"/>
+              <a:t>br</a:t>
+            </a:r>
+            <a:r>
+              <a:rPr lang="pt-BR" sz="2200" dirty="0"/>
+              <a:t>; </a:t>
+            </a:r>
+            <a:r>
+              <a:rPr lang="pt-BR" sz="2200" dirty="0" err="1"/>
+              <a:t>ul</a:t>
+            </a:r>
+            <a:r>
+              <a:rPr lang="pt-BR" sz="2200" dirty="0"/>
+              <a:t>/li; </a:t>
+            </a:r>
+            <a:r>
+              <a:rPr lang="pt-BR" sz="2200" dirty="0" err="1"/>
+              <a:t>ol</a:t>
+            </a:r>
+            <a:r>
+              <a:rPr lang="pt-BR" sz="2200" dirty="0"/>
+              <a:t>/li; </a:t>
+            </a:r>
+          </a:p>
+          <a:p>
+            <a:pPr algn="just"/>
+            <a:r>
+              <a:rPr lang="pt-BR" sz="2200" dirty="0"/>
+              <a:t>	2. a/</a:t>
+            </a:r>
+            <a:r>
+              <a:rPr lang="pt-BR" sz="2200" b="1" dirty="0" err="1">
+                <a:solidFill>
+                  <a:srgbClr val="FF0000"/>
+                </a:solidFill>
+              </a:rPr>
+              <a:t>href</a:t>
+            </a:r>
+            <a:r>
+              <a:rPr lang="pt-BR" sz="2200" b="1" dirty="0">
+                <a:solidFill>
+                  <a:srgbClr val="FF0000"/>
+                </a:solidFill>
+              </a:rPr>
+              <a:t>/target</a:t>
+            </a:r>
+            <a:r>
+              <a:rPr lang="pt-BR" sz="2200" dirty="0"/>
+              <a:t>; </a:t>
+            </a:r>
+            <a:r>
+              <a:rPr lang="pt-BR" sz="2200" dirty="0" err="1"/>
+              <a:t>img</a:t>
+            </a:r>
+            <a:r>
+              <a:rPr lang="pt-BR" sz="2200" dirty="0"/>
+              <a:t>/</a:t>
+            </a:r>
+            <a:r>
+              <a:rPr lang="pt-BR" sz="2200" b="1" dirty="0" err="1">
+                <a:solidFill>
+                  <a:srgbClr val="FF0000"/>
+                </a:solidFill>
+              </a:rPr>
+              <a:t>src</a:t>
+            </a:r>
+            <a:r>
+              <a:rPr lang="pt-BR" sz="2200" b="1" dirty="0">
+                <a:solidFill>
+                  <a:srgbClr val="FF0000"/>
+                </a:solidFill>
+              </a:rPr>
+              <a:t>/</a:t>
+            </a:r>
+            <a:r>
+              <a:rPr lang="pt-BR" sz="2200" b="1" dirty="0" err="1">
+                <a:solidFill>
+                  <a:srgbClr val="FF0000"/>
+                </a:solidFill>
+              </a:rPr>
+              <a:t>alt</a:t>
+            </a:r>
+            <a:r>
+              <a:rPr lang="pt-BR" sz="2200" dirty="0"/>
+              <a:t>; </a:t>
+            </a:r>
+          </a:p>
+          <a:p>
+            <a:pPr algn="just"/>
+            <a:r>
+              <a:rPr lang="pt-BR" sz="2200" dirty="0"/>
+              <a:t>	3. figure/</a:t>
+            </a:r>
+            <a:r>
+              <a:rPr lang="pt-BR" sz="2200" dirty="0" err="1"/>
+              <a:t>img</a:t>
+            </a:r>
+            <a:r>
+              <a:rPr lang="pt-BR" sz="2200" dirty="0"/>
+              <a:t>/</a:t>
+            </a:r>
+            <a:r>
+              <a:rPr lang="pt-BR" sz="2200" dirty="0" err="1"/>
+              <a:t>figcaption</a:t>
+            </a:r>
+            <a:r>
+              <a:rPr lang="pt-BR" sz="2200" dirty="0"/>
+              <a:t>; (</a:t>
+            </a:r>
+            <a:r>
+              <a:rPr lang="pt-BR" sz="2200" dirty="0">
+                <a:hlinkClick r:id="rId2"/>
+              </a:rPr>
+              <a:t>https://br.freepik.com/fotos/</a:t>
+            </a:r>
+            <a:r>
+              <a:rPr lang="pt-BR" sz="2200" dirty="0" err="1">
+                <a:hlinkClick r:id="rId2"/>
+              </a:rPr>
+              <a:t>cdn</a:t>
+            </a:r>
+            <a:r>
+              <a:rPr lang="pt-BR" sz="2200" dirty="0"/>
+              <a:t>)</a:t>
+            </a:r>
+          </a:p>
+          <a:p>
+            <a:pPr algn="just"/>
+            <a:r>
+              <a:rPr lang="pt-BR" sz="2200" dirty="0"/>
+              <a:t>	4. header; </a:t>
+            </a:r>
+            <a:r>
+              <a:rPr lang="pt-BR" sz="2200" dirty="0" err="1"/>
+              <a:t>footer</a:t>
+            </a:r>
+            <a:r>
+              <a:rPr lang="pt-BR" sz="2200" dirty="0"/>
+              <a:t>; </a:t>
+            </a:r>
+            <a:r>
+              <a:rPr lang="pt-BR" sz="2200" dirty="0" err="1"/>
+              <a:t>section</a:t>
+            </a:r>
+            <a:r>
+              <a:rPr lang="pt-BR" sz="2200" dirty="0"/>
+              <a:t>; </a:t>
+            </a:r>
+            <a:r>
+              <a:rPr lang="pt-BR" sz="2200" dirty="0" err="1"/>
+              <a:t>aside</a:t>
+            </a:r>
+            <a:r>
+              <a:rPr lang="pt-BR" sz="2200" dirty="0"/>
+              <a:t>; </a:t>
+            </a:r>
+            <a:r>
+              <a:rPr lang="pt-BR" sz="2200" dirty="0" err="1"/>
+              <a:t>div</a:t>
+            </a:r>
+            <a:r>
+              <a:rPr lang="pt-BR" sz="2200" dirty="0"/>
+              <a:t>; </a:t>
+            </a:r>
+          </a:p>
+          <a:p>
+            <a:pPr algn="just"/>
+            <a:r>
+              <a:rPr lang="pt-BR" sz="2200" dirty="0"/>
+              <a:t>	5. </a:t>
+            </a:r>
+            <a:r>
+              <a:rPr lang="pt-BR" sz="2200" dirty="0" err="1"/>
+              <a:t>nav</a:t>
+            </a:r>
+            <a:r>
+              <a:rPr lang="pt-BR" sz="2200" dirty="0"/>
+              <a:t>;</a:t>
+            </a:r>
+          </a:p>
+          <a:p>
+            <a:pPr algn="just"/>
+            <a:r>
+              <a:rPr lang="pt-BR" sz="2200" dirty="0"/>
+              <a:t>	6. </a:t>
+            </a:r>
+            <a:r>
+              <a:rPr lang="pt-BR" sz="2200" dirty="0" err="1"/>
+              <a:t>table</a:t>
+            </a:r>
+            <a:r>
+              <a:rPr lang="pt-BR" sz="2200" dirty="0"/>
+              <a:t> (</a:t>
+            </a:r>
+            <a:r>
+              <a:rPr lang="pt-BR" sz="2200" dirty="0">
+                <a:hlinkClick r:id="rId3"/>
+              </a:rPr>
+              <a:t>https://www.tablesgenerator.com/</a:t>
+            </a:r>
+            <a:r>
+              <a:rPr lang="pt-BR" sz="2200" dirty="0"/>
+              <a:t>); </a:t>
+            </a:r>
+          </a:p>
+          <a:p>
+            <a:pPr algn="just"/>
+            <a:r>
+              <a:rPr lang="pt-BR" sz="2200" dirty="0"/>
+              <a:t>	7. </a:t>
+            </a:r>
+            <a:r>
+              <a:rPr lang="pt-BR" sz="2200" dirty="0" err="1"/>
+              <a:t>form</a:t>
+            </a:r>
+            <a:r>
+              <a:rPr lang="pt-BR" sz="2200" dirty="0"/>
+              <a:t>/</a:t>
+            </a:r>
+            <a:r>
+              <a:rPr lang="pt-BR" sz="2200" dirty="0">
+                <a:solidFill>
+                  <a:schemeClr val="tx1"/>
+                </a:solidFill>
+              </a:rPr>
+              <a:t>input.</a:t>
+            </a:r>
+          </a:p>
+          <a:p>
+            <a:pPr algn="just"/>
+            <a:endParaRPr lang="pt-BR" sz="2200" dirty="0">
+              <a:solidFill>
+                <a:schemeClr val="tx1"/>
+              </a:solidFill>
+            </a:endParaRPr>
+          </a:p>
+          <a:p>
+            <a:pPr algn="just"/>
+            <a:r>
+              <a:rPr lang="pt-BR" sz="2200" b="1" dirty="0"/>
+              <a:t>	Estudo: </a:t>
+            </a:r>
+            <a:r>
+              <a:rPr lang="pt-BR" sz="2200" dirty="0">
+                <a:hlinkClick r:id="rId4"/>
+              </a:rPr>
+              <a:t>https://www.w3schools.com/html/</a:t>
+            </a:r>
+            <a:endParaRPr lang="pt-BR" sz="2200" dirty="0"/>
           </a:p>
         </p:txBody>
       </p:sp>
     </p:spTree>
     <p:extLst>
       <p:ext uri="{BB962C8B-B14F-4D97-AF65-F5344CB8AC3E}">
-        <p14:creationId xmlns:p14="http://schemas.microsoft.com/office/powerpoint/2010/main" val="2134821725"/>
+        <p14:creationId xmlns:p14="http://schemas.microsoft.com/office/powerpoint/2010/main" val="514062819"/>
       </p:ext>
     </p:extLst>
   </p:cSld>
@@ -6902,20 +7790,20 @@
         </p:spPr>
         <p:txBody>
           <a:bodyPr>
-            <a:normAutofit fontScale="90000"/>
+            <a:normAutofit/>
           </a:bodyPr>
           <a:lstStyle/>
           <a:p>
             <a:pPr algn="ctr"/>
             <a:r>
-              <a:rPr lang="pt-BR" dirty="0">
+              <a:rPr lang="pt-BR" sz="3200" dirty="0">
                 <a:solidFill>
                   <a:schemeClr val="bg1"/>
                 </a:solidFill>
               </a:rPr>
-              <a:t>Leitura Específica</a:t>
-            </a:r>
-            <a:endParaRPr lang="en-US" dirty="0">
+              <a:t>Internet - HTML</a:t>
+            </a:r>
+            <a:endParaRPr lang="en-US" sz="3200" dirty="0">
               <a:solidFill>
                 <a:schemeClr val="bg1"/>
               </a:solidFill>
@@ -6937,8 +7825,8 @@
         </p:nvSpPr>
         <p:spPr>
           <a:xfrm>
-            <a:off x="382903" y="1236825"/>
-            <a:ext cx="7022608" cy="3539430"/>
+            <a:off x="382902" y="1236825"/>
+            <a:ext cx="7745097" cy="3785652"/>
           </a:xfrm>
           <a:prstGeom prst="rect">
             <a:avLst/>
@@ -6969,78 +7857,157 @@
           </a:bodyPr>
           <a:lstStyle/>
           <a:p>
-            <a:pPr marL="285750" indent="-285750">
-              <a:buFont typeface="Wingdings" panose="05000000000000000000" pitchFamily="2" charset="2"/>
-              <a:buChar char="ü"/>
+            <a:pPr algn="just"/>
+            <a:r>
+              <a:rPr lang="pt-BR" sz="2400" dirty="0"/>
+              <a:t>Exemplo de Organização de </a:t>
+            </a:r>
+            <a:r>
+              <a:rPr lang="pt-BR" sz="2400" b="1" dirty="0">
+                <a:solidFill>
+                  <a:srgbClr val="FF0000"/>
+                </a:solidFill>
+              </a:rPr>
+              <a:t>Pastas do Site</a:t>
+            </a:r>
+            <a:r>
+              <a:rPr lang="pt-BR" sz="2400" dirty="0"/>
+              <a:t>:</a:t>
+            </a:r>
+          </a:p>
+          <a:p>
+            <a:pPr marL="457200" lvl="1" indent="-457200" algn="just">
+              <a:buFont typeface="+mj-lt"/>
+              <a:buAutoNum type="arabicPeriod"/>
             </a:pPr>
             <a:r>
-              <a:rPr lang="pt-BR" sz="2800" b="1" dirty="0"/>
-              <a:t>Internet / Páginas Web</a:t>
-            </a:r>
-          </a:p>
-          <a:p>
-            <a:pPr marL="285750" indent="-285750">
-              <a:buFont typeface="Wingdings" panose="05000000000000000000" pitchFamily="2" charset="2"/>
-              <a:buChar char="ü"/>
+              <a:rPr lang="pt-BR" sz="2400" b="1" dirty="0" err="1"/>
+              <a:t>assets</a:t>
+            </a:r>
+            <a:endParaRPr lang="pt-BR" sz="2400" b="1" dirty="0"/>
+          </a:p>
+          <a:p>
+            <a:pPr marL="908050" lvl="7" indent="-457200" algn="just">
+              <a:buFont typeface="+mj-lt"/>
+              <a:buAutoNum type="alphaLcPeriod"/>
             </a:pPr>
-            <a:endParaRPr lang="pt-BR" sz="2800" b="1" dirty="0">
+            <a:r>
+              <a:rPr lang="pt-BR" sz="2400" dirty="0" err="1"/>
+              <a:t>img</a:t>
+            </a:r>
+            <a:endParaRPr lang="pt-BR" sz="2400" dirty="0"/>
+          </a:p>
+          <a:p>
+            <a:pPr marL="908050" lvl="7" indent="-457200" algn="just">
+              <a:buFont typeface="+mj-lt"/>
+              <a:buAutoNum type="alphaLcPeriod"/>
+            </a:pPr>
+            <a:r>
+              <a:rPr lang="pt-BR" sz="2400" dirty="0" err="1"/>
+              <a:t>css</a:t>
+            </a:r>
+            <a:endParaRPr lang="pt-BR" sz="2400" dirty="0"/>
+          </a:p>
+          <a:p>
+            <a:pPr marL="908050" lvl="7" indent="-457200" algn="just">
+              <a:buFont typeface="+mj-lt"/>
+              <a:buAutoNum type="alphaLcPeriod"/>
+            </a:pPr>
+            <a:r>
+              <a:rPr lang="pt-BR" sz="2400" dirty="0" err="1"/>
+              <a:t>js</a:t>
+            </a:r>
+            <a:endParaRPr lang="pt-BR" sz="2400" dirty="0"/>
+          </a:p>
+          <a:p>
+            <a:pPr marL="908050" lvl="7" indent="-457200" algn="just">
+              <a:buFont typeface="+mj-lt"/>
+              <a:buAutoNum type="alphaLcPeriod"/>
+            </a:pPr>
+            <a:r>
+              <a:rPr lang="pt-BR" sz="2400" dirty="0" err="1"/>
+              <a:t>mov</a:t>
+            </a:r>
+            <a:endParaRPr lang="pt-BR" sz="2400" dirty="0"/>
+          </a:p>
+          <a:p>
+            <a:pPr marL="457200" lvl="7" indent="-457200" algn="just">
+              <a:buFont typeface="+mj-lt"/>
+              <a:buAutoNum type="arabicPeriod" startAt="2"/>
+            </a:pPr>
+            <a:r>
+              <a:rPr lang="pt-BR" sz="2400" b="1" dirty="0"/>
+              <a:t>site</a:t>
+            </a:r>
+          </a:p>
+          <a:p>
+            <a:pPr algn="just"/>
+            <a:r>
+              <a:rPr lang="pt-BR" sz="2400" dirty="0"/>
+              <a:t>3.	index.html (</a:t>
+            </a:r>
+            <a:r>
+              <a:rPr lang="pt-BR" sz="2400" b="1" dirty="0">
+                <a:solidFill>
+                  <a:srgbClr val="FF0000"/>
+                </a:solidFill>
+              </a:rPr>
+              <a:t>arquivo </a:t>
+            </a:r>
+            <a:r>
+              <a:rPr lang="pt-BR" sz="2400" b="1" dirty="0" err="1">
+                <a:solidFill>
+                  <a:srgbClr val="FF0000"/>
+                </a:solidFill>
+              </a:rPr>
+              <a:t>html</a:t>
+            </a:r>
+            <a:r>
+              <a:rPr lang="pt-BR" sz="2400" dirty="0"/>
+              <a:t>)</a:t>
+            </a:r>
+          </a:p>
+          <a:p>
+            <a:pPr algn="just"/>
+            <a:r>
+              <a:rPr lang="pt-BR" sz="2400" dirty="0"/>
+              <a:t>					</a:t>
+            </a:r>
+          </a:p>
+          <a:p>
+            <a:pPr algn="just"/>
+            <a:r>
+              <a:rPr lang="pt-BR" sz="2400" dirty="0"/>
+              <a:t>					=&gt; </a:t>
+            </a:r>
+            <a:r>
+              <a:rPr lang="pt-BR" sz="2400" b="1" dirty="0" err="1"/>
+              <a:t>Tags</a:t>
+            </a:r>
+            <a:r>
+              <a:rPr lang="pt-BR" sz="2400" b="1" dirty="0"/>
+              <a:t>: </a:t>
+            </a:r>
+            <a:r>
+              <a:rPr lang="pt-BR" sz="2400" b="1" dirty="0" err="1">
+                <a:solidFill>
+                  <a:srgbClr val="FF0000"/>
+                </a:solidFill>
+              </a:rPr>
+              <a:t>Bootstrap</a:t>
+            </a:r>
+            <a:endParaRPr lang="pt-BR" sz="2400" b="1" dirty="0">
               <a:solidFill>
                 <a:srgbClr val="FF0000"/>
               </a:solidFill>
             </a:endParaRPr>
-          </a:p>
-          <a:p>
-            <a:r>
-              <a:rPr lang="pt-BR" sz="2800" dirty="0"/>
-              <a:t>	</a:t>
-            </a:r>
-            <a:r>
-              <a:rPr lang="pt-BR" sz="2800" dirty="0">
-                <a:hlinkClick r:id="rId2"/>
-              </a:rPr>
-              <a:t>https://www.w3schools.com/html/</a:t>
-            </a:r>
-            <a:endParaRPr lang="pt-BR" sz="2800" dirty="0"/>
-          </a:p>
-          <a:p>
-            <a:endParaRPr lang="pt-BR" sz="2800" dirty="0"/>
-          </a:p>
-          <a:p>
-            <a:endParaRPr lang="pt-BR" sz="2800" dirty="0"/>
-          </a:p>
-          <a:p>
-            <a:pPr marL="285750" indent="-285750">
-              <a:buFont typeface="Wingdings" panose="05000000000000000000" pitchFamily="2" charset="2"/>
-              <a:buChar char="ü"/>
-            </a:pPr>
-            <a:r>
-              <a:rPr lang="pt-BR" sz="2800" b="1" dirty="0"/>
-              <a:t>Treinamento Bradesco</a:t>
-            </a:r>
-          </a:p>
-          <a:p>
-            <a:r>
-              <a:rPr lang="pt-BR" sz="2800" dirty="0"/>
-              <a:t>	</a:t>
-            </a:r>
-            <a:r>
-              <a:rPr lang="pt-BR" sz="2800" dirty="0">
-                <a:hlinkClick r:id="rId3"/>
-              </a:rPr>
-              <a:t>https://www.ev.org.br/cursos/html-e-css-na-pratica</a:t>
-            </a:r>
-            <a:r>
-              <a:rPr lang="pt-BR" sz="2800" dirty="0"/>
-              <a:t>	</a:t>
-            </a:r>
-            <a:endParaRPr lang="pt-BR" sz="2800" b="1" dirty="0"/>
           </a:p>
         </p:txBody>
       </p:sp>
     </p:spTree>
     <p:extLst>
       <p:ext uri="{BB962C8B-B14F-4D97-AF65-F5344CB8AC3E}">
-        <p14:creationId xmlns:p14="http://schemas.microsoft.com/office/powerpoint/2010/main" val="2163541789"/>
+        <p14:creationId xmlns:p14="http://schemas.microsoft.com/office/powerpoint/2010/main" val="2134821725"/>
       </p:ext>
     </p:extLst>
   </p:cSld>
@@ -7109,7 +8076,7 @@
                   <a:schemeClr val="bg1"/>
                 </a:solidFill>
               </a:rPr>
-              <a:t>Aprenda+</a:t>
+              <a:t>Leitura Específica</a:t>
             </a:r>
             <a:endParaRPr lang="en-US" dirty="0">
               <a:solidFill>
@@ -7133,8 +8100,8 @@
         </p:nvSpPr>
         <p:spPr>
           <a:xfrm>
-            <a:off x="382902" y="1236825"/>
-            <a:ext cx="7383853" cy="3539430"/>
+            <a:off x="382903" y="1236825"/>
+            <a:ext cx="7022608" cy="3539430"/>
           </a:xfrm>
           <a:prstGeom prst="rect">
             <a:avLst/>
@@ -7170,44 +8137,73 @@
               <a:buChar char="ü"/>
             </a:pPr>
             <a:r>
-              <a:rPr lang="pt-BR" sz="3200" b="1" dirty="0"/>
+              <a:rPr lang="pt-BR" sz="2800" b="1" dirty="0"/>
               <a:t>Internet / Páginas Web</a:t>
             </a:r>
           </a:p>
           <a:p>
-            <a:endParaRPr lang="pt-BR" sz="3200" b="1" dirty="0"/>
-          </a:p>
-          <a:p>
-            <a:r>
-              <a:rPr lang="pt-BR" sz="3200" dirty="0"/>
-              <a:t>	 	</a:t>
-            </a:r>
-            <a:r>
-              <a:rPr lang="pt-BR" sz="3200" dirty="0">
+            <a:pPr marL="285750" indent="-285750">
+              <a:buFont typeface="Wingdings" panose="05000000000000000000" pitchFamily="2" charset="2"/>
+              <a:buChar char="ü"/>
+            </a:pPr>
+            <a:endParaRPr lang="pt-BR" sz="2800" b="1" dirty="0">
+              <a:solidFill>
+                <a:srgbClr val="FF0000"/>
+              </a:solidFill>
+            </a:endParaRPr>
+          </a:p>
+          <a:p>
+            <a:r>
+              <a:rPr lang="pt-BR" sz="2800" dirty="0"/>
+              <a:t>	</a:t>
+            </a:r>
+            <a:r>
+              <a:rPr lang="pt-BR" sz="2800" dirty="0">
                 <a:hlinkClick r:id="rId2"/>
               </a:rPr>
-              <a:t>https://www.cursoemvideo.com/curso/html5/</a:t>
-            </a:r>
-            <a:r>
-              <a:rPr lang="pt-BR" sz="3200" dirty="0"/>
-              <a:t>  </a:t>
-            </a:r>
-          </a:p>
-          <a:p>
-            <a:r>
-              <a:rPr lang="pt-BR" sz="3200" dirty="0"/>
-              <a:t> </a:t>
-            </a:r>
-          </a:p>
-          <a:p>
-            <a:endParaRPr lang="pt-BR" sz="3200" b="1" dirty="0"/>
+              <a:t>https://www.w3schools.com/html/</a:t>
+            </a:r>
+            <a:endParaRPr lang="pt-BR" sz="2800" dirty="0"/>
+          </a:p>
+          <a:p>
+            <a:endParaRPr lang="pt-BR" sz="2800" dirty="0"/>
+          </a:p>
+          <a:p>
+            <a:endParaRPr lang="pt-BR" sz="2800" dirty="0"/>
+          </a:p>
+          <a:p>
+            <a:pPr marL="285750" indent="-285750">
+              <a:buFont typeface="Wingdings" panose="05000000000000000000" pitchFamily="2" charset="2"/>
+              <a:buChar char="ü"/>
+            </a:pPr>
+            <a:r>
+              <a:rPr lang="pt-BR" sz="2800" b="1" dirty="0"/>
+              <a:t>Treinamento Bradesco</a:t>
+            </a:r>
+          </a:p>
+          <a:p>
+            <a:r>
+              <a:rPr lang="pt-BR" sz="2800" dirty="0"/>
+              <a:t>	</a:t>
+            </a:r>
+            <a:r>
+              <a:rPr lang="pt-BR" sz="2800" dirty="0">
+                <a:hlinkClick r:id="rId3"/>
+              </a:rPr>
+              <a:t>https://www.ev.org.br/cursos/html-e-css-na-pratica</a:t>
+            </a:r>
+            <a:r>
+              <a:rPr lang="pt-BR" sz="2800" dirty="0"/>
+              <a:t>	</a:t>
+            </a:r>
+            <a:endParaRPr lang="pt-BR" sz="2800" b="1" dirty="0"/>
           </a:p>
         </p:txBody>
       </p:sp>
     </p:spTree>
     <p:extLst>
       <p:ext uri="{BB962C8B-B14F-4D97-AF65-F5344CB8AC3E}">
-        <p14:creationId xmlns:p14="http://schemas.microsoft.com/office/powerpoint/2010/main" val="1267991514"/>
+        <p14:creationId xmlns:p14="http://schemas.microsoft.com/office/powerpoint/2010/main" val="2163541789"/>
       </p:ext>
     </p:extLst>
   </p:cSld>
@@ -7265,20 +8261,20 @@
         </p:spPr>
         <p:txBody>
           <a:bodyPr>
-            <a:noAutofit/>
+            <a:normAutofit fontScale="90000"/>
           </a:bodyPr>
           <a:lstStyle/>
           <a:p>
             <a:pPr algn="ctr"/>
             <a:r>
-              <a:rPr lang="pt-BR" sz="3200" dirty="0">
+              <a:rPr lang="pt-BR" dirty="0">
                 <a:solidFill>
                   <a:schemeClr val="bg1"/>
                 </a:solidFill>
               </a:rPr>
-              <a:t>Dinâmica/Atividades</a:t>
-            </a:r>
-            <a:endParaRPr lang="en-US" sz="3200" dirty="0">
+              <a:t>Aprenda+</a:t>
+            </a:r>
+            <a:endParaRPr lang="en-US" dirty="0">
               <a:solidFill>
                 <a:schemeClr val="bg1"/>
               </a:solidFill>
@@ -7300,8 +8296,8 @@
         </p:nvSpPr>
         <p:spPr>
           <a:xfrm>
-            <a:off x="349035" y="1152849"/>
-            <a:ext cx="7383853" cy="2554545"/>
+            <a:off x="382902" y="1236825"/>
+            <a:ext cx="7383853" cy="3539430"/>
           </a:xfrm>
           <a:prstGeom prst="rect">
             <a:avLst/>
@@ -7332,75 +8328,49 @@
           </a:bodyPr>
           <a:lstStyle/>
           <a:p>
-            <a:pPr algn="just" eaLnBrk="0" hangingPunct="0"/>
-            <a:r>
-              <a:rPr lang="pt-BR" sz="2000" b="1" dirty="0">
-                <a:solidFill>
-                  <a:srgbClr val="FF0000"/>
-                </a:solidFill>
+            <a:pPr marL="285750" indent="-285750">
+              <a:buFont typeface="Wingdings" panose="05000000000000000000" pitchFamily="2" charset="2"/>
+              <a:buChar char="ü"/>
+            </a:pPr>
+            <a:r>
+              <a:rPr lang="pt-BR" sz="3200" b="1" dirty="0"/>
+              <a:t>Internet / Páginas Web</a:t>
+            </a:r>
+          </a:p>
+          <a:p>
+            <a:endParaRPr lang="pt-BR" sz="3200" b="1" dirty="0"/>
+          </a:p>
+          <a:p>
+            <a:r>
+              <a:rPr lang="pt-BR" sz="3200" dirty="0"/>
+              <a:t>	 	</a:t>
+            </a:r>
+            <a:r>
+              <a:rPr lang="pt-BR" sz="3200" dirty="0">
+                <a:hlinkClick r:id="rId2"/>
               </a:rPr>
-              <a:t>1. Laboratório:</a:t>
-            </a:r>
-            <a:r>
-              <a:rPr lang="pt-BR" sz="2000" dirty="0"/>
-              <a:t> (</a:t>
-            </a:r>
-            <a:r>
-              <a:rPr lang="pt-BR" sz="2000" b="1" dirty="0"/>
-              <a:t>codepen.io</a:t>
-            </a:r>
-            <a:r>
-              <a:rPr lang="pt-BR" sz="2000" dirty="0"/>
-              <a:t>)</a:t>
-            </a:r>
-          </a:p>
-          <a:p>
-            <a:pPr algn="just" eaLnBrk="0" hangingPunct="0"/>
-            <a:endParaRPr lang="pt-BR" sz="2000" dirty="0"/>
-          </a:p>
-          <a:p>
-            <a:pPr algn="just" eaLnBrk="0" hangingPunct="0"/>
-            <a:r>
-              <a:rPr lang="pt-BR" sz="2000" dirty="0"/>
-              <a:t>	Criar site</a:t>
-            </a:r>
-          </a:p>
-          <a:p>
-            <a:pPr algn="just" eaLnBrk="0" hangingPunct="0"/>
-            <a:endParaRPr lang="pt-BR" sz="2000" dirty="0"/>
-          </a:p>
-          <a:p>
-            <a:pPr algn="just" eaLnBrk="0" hangingPunct="0"/>
-            <a:endParaRPr lang="pt-BR" sz="2000" dirty="0"/>
-          </a:p>
-          <a:p>
-            <a:pPr algn="just" eaLnBrk="0" hangingPunct="0"/>
-            <a:r>
-              <a:rPr lang="pt-BR" sz="2000" b="1" dirty="0">
-                <a:solidFill>
-                  <a:srgbClr val="FF0000"/>
-                </a:solidFill>
-              </a:rPr>
-              <a:t>2. Extensão:</a:t>
-            </a:r>
-          </a:p>
-          <a:p>
-            <a:pPr algn="just" eaLnBrk="0" hangingPunct="0"/>
-            <a:endParaRPr lang="pt-BR" sz="2000" dirty="0"/>
-          </a:p>
-          <a:p>
-            <a:pPr algn="just" eaLnBrk="0" hangingPunct="0"/>
-            <a:r>
-              <a:rPr lang="pt-BR" sz="2000" dirty="0"/>
-              <a:t>	 Publicar o site.</a:t>
-            </a:r>
+              <a:t>https://www.cursoemvideo.com/curso/html5/</a:t>
+            </a:r>
+            <a:r>
+              <a:rPr lang="pt-BR" sz="3200" dirty="0"/>
+              <a:t>  </a:t>
+            </a:r>
+          </a:p>
+          <a:p>
+            <a:r>
+              <a:rPr lang="pt-BR" sz="3200" dirty="0"/>
+              <a:t> </a:t>
+            </a:r>
+          </a:p>
+          <a:p>
+            <a:endParaRPr lang="pt-BR" sz="3200" b="1" dirty="0"/>
           </a:p>
         </p:txBody>
       </p:sp>
     </p:spTree>
     <p:extLst>
       <p:ext uri="{BB962C8B-B14F-4D97-AF65-F5344CB8AC3E}">
-        <p14:creationId xmlns:p14="http://schemas.microsoft.com/office/powerpoint/2010/main" val="468805735"/>
+        <p14:creationId xmlns:p14="http://schemas.microsoft.com/office/powerpoint/2010/main" val="1267991514"/>
       </p:ext>
     </p:extLst>
   </p:cSld>
@@ -7458,6 +8428,216 @@
         </p:spPr>
         <p:txBody>
           <a:bodyPr>
+            <a:noAutofit/>
+          </a:bodyPr>
+          <a:lstStyle/>
+          <a:p>
+            <a:pPr algn="ctr"/>
+            <a:r>
+              <a:rPr lang="pt-BR" sz="3200" dirty="0">
+                <a:solidFill>
+                  <a:schemeClr val="bg1"/>
+                </a:solidFill>
+              </a:rPr>
+              <a:t>Dinâmica/Atividades</a:t>
+            </a:r>
+            <a:endParaRPr lang="en-US" sz="3200" dirty="0">
+              <a:solidFill>
+                <a:schemeClr val="bg1"/>
+              </a:solidFill>
+            </a:endParaRPr>
+          </a:p>
+        </p:txBody>
+      </p:sp>
+      <p:sp>
+        <p:nvSpPr>
+          <p:cNvPr id="3" name="CaixaDeTexto 2">
+            <a:extLst>
+              <a:ext uri="{FF2B5EF4-FFF2-40B4-BE49-F238E27FC236}">
+                <a16:creationId xmlns:a16="http://schemas.microsoft.com/office/drawing/2014/main" id="{376663E4-1CEE-9F31-C5DA-EFDC6BF8B1CE}"/>
+              </a:ext>
+            </a:extLst>
+          </p:cNvPr>
+          <p:cNvSpPr txBox="1"/>
+          <p:nvPr/>
+        </p:nvSpPr>
+        <p:spPr>
+          <a:xfrm>
+            <a:off x="349035" y="1152849"/>
+            <a:ext cx="7383853" cy="2554545"/>
+          </a:xfrm>
+          <a:prstGeom prst="rect">
+            <a:avLst/>
+          </a:prstGeom>
+          <a:noFill/>
+          <a:ln w="12700" cap="flat">
+            <a:noFill/>
+            <a:miter lim="400000"/>
+          </a:ln>
+          <a:effectLst/>
+          <a:sp3d/>
+        </p:spPr>
+        <p:style>
+          <a:lnRef idx="0">
+            <a:scrgbClr r="0" g="0" b="0"/>
+          </a:lnRef>
+          <a:fillRef idx="0">
+            <a:scrgbClr r="0" g="0" b="0"/>
+          </a:fillRef>
+          <a:effectRef idx="0">
+            <a:scrgbClr r="0" g="0" b="0"/>
+          </a:effectRef>
+          <a:fontRef idx="none"/>
+        </p:style>
+        <p:txBody>
+          <a:bodyPr wrap="square">
+            <a:spAutoFit/>
+          </a:bodyPr>
+          <a:lstStyle/>
+          <a:p>
+            <a:pPr algn="just" eaLnBrk="0" hangingPunct="0"/>
+            <a:r>
+              <a:rPr lang="pt-BR" sz="2000" b="1" dirty="0">
+                <a:solidFill>
+                  <a:srgbClr val="FF0000"/>
+                </a:solidFill>
+              </a:rPr>
+              <a:t>1. Laboratório:</a:t>
+            </a:r>
+            <a:r>
+              <a:rPr lang="pt-BR" sz="2000" dirty="0"/>
+              <a:t> (</a:t>
+            </a:r>
+            <a:r>
+              <a:rPr lang="pt-BR" sz="2000" b="1" dirty="0"/>
+              <a:t>codepen.io</a:t>
+            </a:r>
+            <a:r>
+              <a:rPr lang="pt-BR" sz="2000" dirty="0"/>
+              <a:t>)</a:t>
+            </a:r>
+          </a:p>
+          <a:p>
+            <a:pPr algn="just" eaLnBrk="0" hangingPunct="0"/>
+            <a:endParaRPr lang="pt-BR" sz="2000" dirty="0"/>
+          </a:p>
+          <a:p>
+            <a:pPr algn="just" eaLnBrk="0" hangingPunct="0"/>
+            <a:r>
+              <a:rPr lang="pt-BR" sz="2000" dirty="0"/>
+              <a:t>	Criar site (</a:t>
+            </a:r>
+            <a:r>
+              <a:rPr lang="pt-BR" sz="2000" b="1" dirty="0">
+                <a:solidFill>
+                  <a:srgbClr val="FF0000"/>
+                </a:solidFill>
+              </a:rPr>
+              <a:t>conjunto de páginas web</a:t>
+            </a:r>
+            <a:r>
+              <a:rPr lang="pt-BR" sz="2000" dirty="0"/>
+              <a:t>) - </a:t>
+            </a:r>
+            <a:r>
+              <a:rPr lang="pt-BR" sz="2000" b="1" dirty="0"/>
+              <a:t>Layout do site</a:t>
+            </a:r>
+            <a:endParaRPr lang="pt-BR" sz="2000" dirty="0"/>
+          </a:p>
+          <a:p>
+            <a:pPr algn="just" eaLnBrk="0" hangingPunct="0"/>
+            <a:endParaRPr lang="pt-BR" sz="2000" dirty="0"/>
+          </a:p>
+          <a:p>
+            <a:pPr algn="just" eaLnBrk="0" hangingPunct="0"/>
+            <a:endParaRPr lang="pt-BR" sz="2000" dirty="0"/>
+          </a:p>
+          <a:p>
+            <a:pPr algn="just" eaLnBrk="0" hangingPunct="0"/>
+            <a:r>
+              <a:rPr lang="pt-BR" sz="2000" b="1" dirty="0">
+                <a:solidFill>
+                  <a:srgbClr val="FF0000"/>
+                </a:solidFill>
+              </a:rPr>
+              <a:t>2. Extensão:</a:t>
+            </a:r>
+          </a:p>
+          <a:p>
+            <a:pPr algn="just" eaLnBrk="0" hangingPunct="0"/>
+            <a:endParaRPr lang="pt-BR" sz="2000" dirty="0"/>
+          </a:p>
+          <a:p>
+            <a:pPr algn="just" eaLnBrk="0" hangingPunct="0"/>
+            <a:r>
+              <a:rPr lang="pt-BR" sz="2000" dirty="0"/>
+              <a:t>	 Publicar o site.</a:t>
+            </a:r>
+          </a:p>
+        </p:txBody>
+      </p:sp>
+    </p:spTree>
+    <p:extLst>
+      <p:ext uri="{BB962C8B-B14F-4D97-AF65-F5344CB8AC3E}">
+        <p14:creationId xmlns:p14="http://schemas.microsoft.com/office/powerpoint/2010/main" val="468805735"/>
+      </p:ext>
+    </p:extLst>
+  </p:cSld>
+  <p:clrMapOvr>
+    <a:masterClrMapping/>
+  </p:clrMapOvr>
+  <p:transition spd="med"/>
+</p:sld>
+</file>
+
+<file path=ppt/slides/slide9.xml><?xml version="1.0" encoding="utf-8"?>
+<p:sld xmlns:a="http://schemas.openxmlformats.org/drawingml/2006/main" xmlns:r="http://schemas.openxmlformats.org/officeDocument/2006/relationships" xmlns:p="http://schemas.openxmlformats.org/presentationml/2006/main">
+  <p:cSld>
+    <p:spTree>
+      <p:nvGrpSpPr>
+        <p:cNvPr id="1" name=""/>
+        <p:cNvGrpSpPr/>
+        <p:nvPr/>
+      </p:nvGrpSpPr>
+      <p:grpSpPr>
+        <a:xfrm>
+          <a:off x="0" y="0"/>
+          <a:ext cx="0" cy="0"/>
+          <a:chOff x="0" y="0"/>
+          <a:chExt cx="0" cy="0"/>
+        </a:xfrm>
+      </p:grpSpPr>
+      <p:sp>
+        <p:nvSpPr>
+          <p:cNvPr id="6" name="Título 1">
+            <a:extLst>
+              <a:ext uri="{FF2B5EF4-FFF2-40B4-BE49-F238E27FC236}">
+                <a16:creationId xmlns:a16="http://schemas.microsoft.com/office/drawing/2014/main" id="{3DF4DE9F-E280-4DD5-A63B-3C136B01E07D}"/>
+              </a:ext>
+            </a:extLst>
+          </p:cNvPr>
+          <p:cNvSpPr>
+            <a:spLocks noGrp="1"/>
+          </p:cNvSpPr>
+          <p:nvPr>
+            <p:ph type="title"/>
+          </p:nvPr>
+        </p:nvSpPr>
+        <p:spPr>
+          <a:xfrm>
+            <a:off x="1809572" y="170646"/>
+            <a:ext cx="4866887" cy="942000"/>
+          </a:xfrm>
+          <a:prstGeom prst="flowChartDocument">
+            <a:avLst/>
+          </a:prstGeom>
+          <a:solidFill>
+            <a:srgbClr val="F00E3E"/>
+          </a:solidFill>
+        </p:spPr>
+        <p:txBody>
+          <a:bodyPr>
             <a:normAutofit/>
           </a:bodyPr>
           <a:lstStyle/>
@@ -7650,687 +8830,6 @@
     <p:extLst>
       <p:ext uri="{BB962C8B-B14F-4D97-AF65-F5344CB8AC3E}">
         <p14:creationId xmlns:p14="http://schemas.microsoft.com/office/powerpoint/2010/main" val="1713267863"/>
-      </p:ext>
-    </p:extLst>
-  </p:cSld>
-  <p:clrMapOvr>
-    <a:masterClrMapping/>
-  </p:clrMapOvr>
-  <p:transition spd="med"/>
-</p:sld>
-</file>
-
-<file path=ppt/slides/slide9.xml><?xml version="1.0" encoding="utf-8"?>
-<p:sld xmlns:a="http://schemas.openxmlformats.org/drawingml/2006/main" xmlns:r="http://schemas.openxmlformats.org/officeDocument/2006/relationships" xmlns:p="http://schemas.openxmlformats.org/presentationml/2006/main">
-  <p:cSld>
-    <p:spTree>
-      <p:nvGrpSpPr>
-        <p:cNvPr id="1" name=""/>
-        <p:cNvGrpSpPr/>
-        <p:nvPr/>
-      </p:nvGrpSpPr>
-      <p:grpSpPr>
-        <a:xfrm>
-          <a:off x="0" y="0"/>
-          <a:ext cx="0" cy="0"/>
-          <a:chOff x="0" y="0"/>
-          <a:chExt cx="0" cy="0"/>
-        </a:xfrm>
-      </p:grpSpPr>
-      <p:sp>
-        <p:nvSpPr>
-          <p:cNvPr id="8" name="Title 1">
-            <a:extLst>
-              <a:ext uri="{FF2B5EF4-FFF2-40B4-BE49-F238E27FC236}">
-                <a16:creationId xmlns:a16="http://schemas.microsoft.com/office/drawing/2014/main" id="{EBCB13E4-4A11-48C5-A5A3-7FAB1396ADAB}"/>
-              </a:ext>
-            </a:extLst>
-          </p:cNvPr>
-          <p:cNvSpPr txBox="1">
-            <a:spLocks/>
-          </p:cNvSpPr>
-          <p:nvPr/>
-        </p:nvSpPr>
-        <p:spPr>
-          <a:xfrm>
-            <a:off x="442913" y="2559082"/>
-            <a:ext cx="8057620" cy="722312"/>
-          </a:xfrm>
-          <a:prstGeom prst="rect">
-            <a:avLst/>
-          </a:prstGeom>
-          <a:ln w="12700">
-            <a:miter lim="400000"/>
-          </a:ln>
-          <a:extLst>
-            <a:ext uri="{C572A759-6A51-4108-AA02-DFA0A04FC94B}">
-              <ma14:wrappingTextBoxFlag xmlns:ma14="http://schemas.microsoft.com/office/mac/drawingml/2011/main" xmlns="" val="1"/>
-            </a:ext>
-          </a:extLst>
-        </p:spPr>
-        <p:txBody>
-          <a:bodyPr lIns="45719" rIns="45719" anchor="ctr">
-            <a:noAutofit/>
-          </a:bodyPr>
-          <a:lstStyle>
-            <a:lvl1pPr marL="0" marR="0" indent="0" algn="ctr" defTabSz="457200" rtl="0" latinLnBrk="0">
-              <a:lnSpc>
-                <a:spcPct val="100000"/>
-              </a:lnSpc>
-              <a:spcBef>
-                <a:spcPts val="0"/>
-              </a:spcBef>
-              <a:spcAft>
-                <a:spcPts val="0"/>
-              </a:spcAft>
-              <a:buClrTx/>
-              <a:buSzTx/>
-              <a:buFontTx/>
-              <a:buNone/>
-              <a:tabLst/>
-              <a:defRPr sz="4400" b="0" i="0" u="none" strike="noStrike" cap="none" spc="0" baseline="0">
-                <a:ln>
-                  <a:noFill/>
-                </a:ln>
-                <a:solidFill>
-                  <a:srgbClr val="000000"/>
-                </a:solidFill>
-                <a:uFillTx/>
-                <a:latin typeface="+mj-lt"/>
-                <a:ea typeface="+mj-ea"/>
-                <a:cs typeface="+mj-cs"/>
-                <a:sym typeface="Calibri"/>
-              </a:defRPr>
-            </a:lvl1pPr>
-            <a:lvl2pPr marL="0" marR="0" indent="0" algn="ctr" defTabSz="457200" rtl="0" latinLnBrk="0">
-              <a:lnSpc>
-                <a:spcPct val="100000"/>
-              </a:lnSpc>
-              <a:spcBef>
-                <a:spcPts val="0"/>
-              </a:spcBef>
-              <a:spcAft>
-                <a:spcPts val="0"/>
-              </a:spcAft>
-              <a:buClrTx/>
-              <a:buSzTx/>
-              <a:buFontTx/>
-              <a:buNone/>
-              <a:tabLst/>
-              <a:defRPr sz="4400" b="0" i="0" u="none" strike="noStrike" cap="none" spc="0" baseline="0">
-                <a:ln>
-                  <a:noFill/>
-                </a:ln>
-                <a:solidFill>
-                  <a:srgbClr val="000000"/>
-                </a:solidFill>
-                <a:uFillTx/>
-                <a:latin typeface="+mj-lt"/>
-                <a:ea typeface="+mj-ea"/>
-                <a:cs typeface="+mj-cs"/>
-                <a:sym typeface="Calibri"/>
-              </a:defRPr>
-            </a:lvl2pPr>
-            <a:lvl3pPr marL="0" marR="0" indent="0" algn="ctr" defTabSz="457200" rtl="0" latinLnBrk="0">
-              <a:lnSpc>
-                <a:spcPct val="100000"/>
-              </a:lnSpc>
-              <a:spcBef>
-                <a:spcPts val="0"/>
-              </a:spcBef>
-              <a:spcAft>
-                <a:spcPts val="0"/>
-              </a:spcAft>
-              <a:buClrTx/>
-              <a:buSzTx/>
-              <a:buFontTx/>
-              <a:buNone/>
-              <a:tabLst/>
-              <a:defRPr sz="4400" b="0" i="0" u="none" strike="noStrike" cap="none" spc="0" baseline="0">
-                <a:ln>
-                  <a:noFill/>
-                </a:ln>
-                <a:solidFill>
-                  <a:srgbClr val="000000"/>
-                </a:solidFill>
-                <a:uFillTx/>
-                <a:latin typeface="+mj-lt"/>
-                <a:ea typeface="+mj-ea"/>
-                <a:cs typeface="+mj-cs"/>
-                <a:sym typeface="Calibri"/>
-              </a:defRPr>
-            </a:lvl3pPr>
-            <a:lvl4pPr marL="0" marR="0" indent="0" algn="ctr" defTabSz="457200" rtl="0" latinLnBrk="0">
-              <a:lnSpc>
-                <a:spcPct val="100000"/>
-              </a:lnSpc>
-              <a:spcBef>
-                <a:spcPts val="0"/>
-              </a:spcBef>
-              <a:spcAft>
-                <a:spcPts val="0"/>
-              </a:spcAft>
-              <a:buClrTx/>
-              <a:buSzTx/>
-              <a:buFontTx/>
-              <a:buNone/>
-              <a:tabLst/>
-              <a:defRPr sz="4400" b="0" i="0" u="none" strike="noStrike" cap="none" spc="0" baseline="0">
-                <a:ln>
-                  <a:noFill/>
-                </a:ln>
-                <a:solidFill>
-                  <a:srgbClr val="000000"/>
-                </a:solidFill>
-                <a:uFillTx/>
-                <a:latin typeface="+mj-lt"/>
-                <a:ea typeface="+mj-ea"/>
-                <a:cs typeface="+mj-cs"/>
-                <a:sym typeface="Calibri"/>
-              </a:defRPr>
-            </a:lvl4pPr>
-            <a:lvl5pPr marL="0" marR="0" indent="0" algn="ctr" defTabSz="457200" rtl="0" latinLnBrk="0">
-              <a:lnSpc>
-                <a:spcPct val="100000"/>
-              </a:lnSpc>
-              <a:spcBef>
-                <a:spcPts val="0"/>
-              </a:spcBef>
-              <a:spcAft>
-                <a:spcPts val="0"/>
-              </a:spcAft>
-              <a:buClrTx/>
-              <a:buSzTx/>
-              <a:buFontTx/>
-              <a:buNone/>
-              <a:tabLst/>
-              <a:defRPr sz="4400" b="0" i="0" u="none" strike="noStrike" cap="none" spc="0" baseline="0">
-                <a:ln>
-                  <a:noFill/>
-                </a:ln>
-                <a:solidFill>
-                  <a:srgbClr val="000000"/>
-                </a:solidFill>
-                <a:uFillTx/>
-                <a:latin typeface="+mj-lt"/>
-                <a:ea typeface="+mj-ea"/>
-                <a:cs typeface="+mj-cs"/>
-                <a:sym typeface="Calibri"/>
-              </a:defRPr>
-            </a:lvl5pPr>
-            <a:lvl6pPr marL="0" marR="0" indent="0" algn="ctr" defTabSz="457200" rtl="0" latinLnBrk="0">
-              <a:lnSpc>
-                <a:spcPct val="100000"/>
-              </a:lnSpc>
-              <a:spcBef>
-                <a:spcPts val="0"/>
-              </a:spcBef>
-              <a:spcAft>
-                <a:spcPts val="0"/>
-              </a:spcAft>
-              <a:buClrTx/>
-              <a:buSzTx/>
-              <a:buFontTx/>
-              <a:buNone/>
-              <a:tabLst/>
-              <a:defRPr sz="4400" b="0" i="0" u="none" strike="noStrike" cap="none" spc="0" baseline="0">
-                <a:ln>
-                  <a:noFill/>
-                </a:ln>
-                <a:solidFill>
-                  <a:srgbClr val="000000"/>
-                </a:solidFill>
-                <a:uFillTx/>
-                <a:latin typeface="+mj-lt"/>
-                <a:ea typeface="+mj-ea"/>
-                <a:cs typeface="+mj-cs"/>
-                <a:sym typeface="Calibri"/>
-              </a:defRPr>
-            </a:lvl6pPr>
-            <a:lvl7pPr marL="0" marR="0" indent="0" algn="ctr" defTabSz="457200" rtl="0" latinLnBrk="0">
-              <a:lnSpc>
-                <a:spcPct val="100000"/>
-              </a:lnSpc>
-              <a:spcBef>
-                <a:spcPts val="0"/>
-              </a:spcBef>
-              <a:spcAft>
-                <a:spcPts val="0"/>
-              </a:spcAft>
-              <a:buClrTx/>
-              <a:buSzTx/>
-              <a:buFontTx/>
-              <a:buNone/>
-              <a:tabLst/>
-              <a:defRPr sz="4400" b="0" i="0" u="none" strike="noStrike" cap="none" spc="0" baseline="0">
-                <a:ln>
-                  <a:noFill/>
-                </a:ln>
-                <a:solidFill>
-                  <a:srgbClr val="000000"/>
-                </a:solidFill>
-                <a:uFillTx/>
-                <a:latin typeface="+mj-lt"/>
-                <a:ea typeface="+mj-ea"/>
-                <a:cs typeface="+mj-cs"/>
-                <a:sym typeface="Calibri"/>
-              </a:defRPr>
-            </a:lvl7pPr>
-            <a:lvl8pPr marL="0" marR="0" indent="0" algn="ctr" defTabSz="457200" rtl="0" latinLnBrk="0">
-              <a:lnSpc>
-                <a:spcPct val="100000"/>
-              </a:lnSpc>
-              <a:spcBef>
-                <a:spcPts val="0"/>
-              </a:spcBef>
-              <a:spcAft>
-                <a:spcPts val="0"/>
-              </a:spcAft>
-              <a:buClrTx/>
-              <a:buSzTx/>
-              <a:buFontTx/>
-              <a:buNone/>
-              <a:tabLst/>
-              <a:defRPr sz="4400" b="0" i="0" u="none" strike="noStrike" cap="none" spc="0" baseline="0">
-                <a:ln>
-                  <a:noFill/>
-                </a:ln>
-                <a:solidFill>
-                  <a:srgbClr val="000000"/>
-                </a:solidFill>
-                <a:uFillTx/>
-                <a:latin typeface="+mj-lt"/>
-                <a:ea typeface="+mj-ea"/>
-                <a:cs typeface="+mj-cs"/>
-                <a:sym typeface="Calibri"/>
-              </a:defRPr>
-            </a:lvl8pPr>
-            <a:lvl9pPr marL="0" marR="0" indent="0" algn="ctr" defTabSz="457200" rtl="0" latinLnBrk="0">
-              <a:lnSpc>
-                <a:spcPct val="100000"/>
-              </a:lnSpc>
-              <a:spcBef>
-                <a:spcPts val="0"/>
-              </a:spcBef>
-              <a:spcAft>
-                <a:spcPts val="0"/>
-              </a:spcAft>
-              <a:buClrTx/>
-              <a:buSzTx/>
-              <a:buFontTx/>
-              <a:buNone/>
-              <a:tabLst/>
-              <a:defRPr sz="4400" b="0" i="0" u="none" strike="noStrike" cap="none" spc="0" baseline="0">
-                <a:ln>
-                  <a:noFill/>
-                </a:ln>
-                <a:solidFill>
-                  <a:srgbClr val="000000"/>
-                </a:solidFill>
-                <a:uFillTx/>
-                <a:latin typeface="+mj-lt"/>
-                <a:ea typeface="+mj-ea"/>
-                <a:cs typeface="+mj-cs"/>
-                <a:sym typeface="Calibri"/>
-              </a:defRPr>
-            </a:lvl9pPr>
-          </a:lstStyle>
-          <a:p>
-            <a:pPr algn="l" defTabSz="265175" hangingPunct="1">
-              <a:defRPr sz="2262">
-                <a:solidFill>
-                  <a:srgbClr val="FFFFFF"/>
-                </a:solidFill>
-              </a:defRPr>
-            </a:pPr>
-            <a:r>
-              <a:rPr lang="pt-BR" sz="3200" b="1" dirty="0">
-                <a:solidFill>
-                  <a:schemeClr val="bg1"/>
-                </a:solidFill>
-              </a:rPr>
-              <a:t>NID – Fundamentação: Tópicos em Informática</a:t>
-            </a:r>
-          </a:p>
-        </p:txBody>
-      </p:sp>
-      <p:sp>
-        <p:nvSpPr>
-          <p:cNvPr id="2" name="Title 1">
-            <a:extLst>
-              <a:ext uri="{FF2B5EF4-FFF2-40B4-BE49-F238E27FC236}">
-                <a16:creationId xmlns:a16="http://schemas.microsoft.com/office/drawing/2014/main" id="{FD974EFB-1823-854F-EADA-689E053E3A06}"/>
-              </a:ext>
-            </a:extLst>
-          </p:cNvPr>
-          <p:cNvSpPr txBox="1">
-            <a:spLocks/>
-          </p:cNvSpPr>
-          <p:nvPr/>
-        </p:nvSpPr>
-        <p:spPr>
-          <a:xfrm>
-            <a:off x="4319197" y="4511164"/>
-            <a:ext cx="3515292" cy="493349"/>
-          </a:xfrm>
-          <a:prstGeom prst="rect">
-            <a:avLst/>
-          </a:prstGeom>
-          <a:ln w="12700">
-            <a:miter lim="400000"/>
-          </a:ln>
-          <a:extLst>
-            <a:ext uri="{C572A759-6A51-4108-AA02-DFA0A04FC94B}">
-              <ma14:wrappingTextBoxFlag xmlns:ma14="http://schemas.microsoft.com/office/mac/drawingml/2011/main" xmlns="" val="1"/>
-            </a:ext>
-          </a:extLst>
-        </p:spPr>
-        <p:txBody>
-          <a:bodyPr lIns="45719" rIns="45719" anchor="ctr">
-            <a:normAutofit/>
-          </a:bodyPr>
-          <a:lstStyle>
-            <a:lvl1pPr marL="0" marR="0" indent="0" algn="ctr" defTabSz="457200" rtl="0" latinLnBrk="0">
-              <a:lnSpc>
-                <a:spcPct val="100000"/>
-              </a:lnSpc>
-              <a:spcBef>
-                <a:spcPts val="0"/>
-              </a:spcBef>
-              <a:spcAft>
-                <a:spcPts val="0"/>
-              </a:spcAft>
-              <a:buClrTx/>
-              <a:buSzTx/>
-              <a:buFontTx/>
-              <a:buNone/>
-              <a:tabLst/>
-              <a:defRPr sz="4400" b="0" i="0" u="none" strike="noStrike" cap="none" spc="0" baseline="0">
-                <a:ln>
-                  <a:noFill/>
-                </a:ln>
-                <a:solidFill>
-                  <a:srgbClr val="000000"/>
-                </a:solidFill>
-                <a:uFillTx/>
-                <a:latin typeface="+mj-lt"/>
-                <a:ea typeface="+mj-ea"/>
-                <a:cs typeface="+mj-cs"/>
-                <a:sym typeface="Calibri"/>
-              </a:defRPr>
-            </a:lvl1pPr>
-            <a:lvl2pPr marL="0" marR="0" indent="0" algn="ctr" defTabSz="457200" rtl="0" latinLnBrk="0">
-              <a:lnSpc>
-                <a:spcPct val="100000"/>
-              </a:lnSpc>
-              <a:spcBef>
-                <a:spcPts val="0"/>
-              </a:spcBef>
-              <a:spcAft>
-                <a:spcPts val="0"/>
-              </a:spcAft>
-              <a:buClrTx/>
-              <a:buSzTx/>
-              <a:buFontTx/>
-              <a:buNone/>
-              <a:tabLst/>
-              <a:defRPr sz="4400" b="0" i="0" u="none" strike="noStrike" cap="none" spc="0" baseline="0">
-                <a:ln>
-                  <a:noFill/>
-                </a:ln>
-                <a:solidFill>
-                  <a:srgbClr val="000000"/>
-                </a:solidFill>
-                <a:uFillTx/>
-                <a:latin typeface="+mj-lt"/>
-                <a:ea typeface="+mj-ea"/>
-                <a:cs typeface="+mj-cs"/>
-                <a:sym typeface="Calibri"/>
-              </a:defRPr>
-            </a:lvl2pPr>
-            <a:lvl3pPr marL="0" marR="0" indent="0" algn="ctr" defTabSz="457200" rtl="0" latinLnBrk="0">
-              <a:lnSpc>
-                <a:spcPct val="100000"/>
-              </a:lnSpc>
-              <a:spcBef>
-                <a:spcPts val="0"/>
-              </a:spcBef>
-              <a:spcAft>
-                <a:spcPts val="0"/>
-              </a:spcAft>
-              <a:buClrTx/>
-              <a:buSzTx/>
-              <a:buFontTx/>
-              <a:buNone/>
-              <a:tabLst/>
-              <a:defRPr sz="4400" b="0" i="0" u="none" strike="noStrike" cap="none" spc="0" baseline="0">
-                <a:ln>
-                  <a:noFill/>
-                </a:ln>
-                <a:solidFill>
-                  <a:srgbClr val="000000"/>
-                </a:solidFill>
-                <a:uFillTx/>
-                <a:latin typeface="+mj-lt"/>
-                <a:ea typeface="+mj-ea"/>
-                <a:cs typeface="+mj-cs"/>
-                <a:sym typeface="Calibri"/>
-              </a:defRPr>
-            </a:lvl3pPr>
-            <a:lvl4pPr marL="0" marR="0" indent="0" algn="ctr" defTabSz="457200" rtl="0" latinLnBrk="0">
-              <a:lnSpc>
-                <a:spcPct val="100000"/>
-              </a:lnSpc>
-              <a:spcBef>
-                <a:spcPts val="0"/>
-              </a:spcBef>
-              <a:spcAft>
-                <a:spcPts val="0"/>
-              </a:spcAft>
-              <a:buClrTx/>
-              <a:buSzTx/>
-              <a:buFontTx/>
-              <a:buNone/>
-              <a:tabLst/>
-              <a:defRPr sz="4400" b="0" i="0" u="none" strike="noStrike" cap="none" spc="0" baseline="0">
-                <a:ln>
-                  <a:noFill/>
-                </a:ln>
-                <a:solidFill>
-                  <a:srgbClr val="000000"/>
-                </a:solidFill>
-                <a:uFillTx/>
-                <a:latin typeface="+mj-lt"/>
-                <a:ea typeface="+mj-ea"/>
-                <a:cs typeface="+mj-cs"/>
-                <a:sym typeface="Calibri"/>
-              </a:defRPr>
-            </a:lvl4pPr>
-            <a:lvl5pPr marL="0" marR="0" indent="0" algn="ctr" defTabSz="457200" rtl="0" latinLnBrk="0">
-              <a:lnSpc>
-                <a:spcPct val="100000"/>
-              </a:lnSpc>
-              <a:spcBef>
-                <a:spcPts val="0"/>
-              </a:spcBef>
-              <a:spcAft>
-                <a:spcPts val="0"/>
-              </a:spcAft>
-              <a:buClrTx/>
-              <a:buSzTx/>
-              <a:buFontTx/>
-              <a:buNone/>
-              <a:tabLst/>
-              <a:defRPr sz="4400" b="0" i="0" u="none" strike="noStrike" cap="none" spc="0" baseline="0">
-                <a:ln>
-                  <a:noFill/>
-                </a:ln>
-                <a:solidFill>
-                  <a:srgbClr val="000000"/>
-                </a:solidFill>
-                <a:uFillTx/>
-                <a:latin typeface="+mj-lt"/>
-                <a:ea typeface="+mj-ea"/>
-                <a:cs typeface="+mj-cs"/>
-                <a:sym typeface="Calibri"/>
-              </a:defRPr>
-            </a:lvl5pPr>
-            <a:lvl6pPr marL="0" marR="0" indent="0" algn="ctr" defTabSz="457200" rtl="0" latinLnBrk="0">
-              <a:lnSpc>
-                <a:spcPct val="100000"/>
-              </a:lnSpc>
-              <a:spcBef>
-                <a:spcPts val="0"/>
-              </a:spcBef>
-              <a:spcAft>
-                <a:spcPts val="0"/>
-              </a:spcAft>
-              <a:buClrTx/>
-              <a:buSzTx/>
-              <a:buFontTx/>
-              <a:buNone/>
-              <a:tabLst/>
-              <a:defRPr sz="4400" b="0" i="0" u="none" strike="noStrike" cap="none" spc="0" baseline="0">
-                <a:ln>
-                  <a:noFill/>
-                </a:ln>
-                <a:solidFill>
-                  <a:srgbClr val="000000"/>
-                </a:solidFill>
-                <a:uFillTx/>
-                <a:latin typeface="+mj-lt"/>
-                <a:ea typeface="+mj-ea"/>
-                <a:cs typeface="+mj-cs"/>
-                <a:sym typeface="Calibri"/>
-              </a:defRPr>
-            </a:lvl6pPr>
-            <a:lvl7pPr marL="0" marR="0" indent="0" algn="ctr" defTabSz="457200" rtl="0" latinLnBrk="0">
-              <a:lnSpc>
-                <a:spcPct val="100000"/>
-              </a:lnSpc>
-              <a:spcBef>
-                <a:spcPts val="0"/>
-              </a:spcBef>
-              <a:spcAft>
-                <a:spcPts val="0"/>
-              </a:spcAft>
-              <a:buClrTx/>
-              <a:buSzTx/>
-              <a:buFontTx/>
-              <a:buNone/>
-              <a:tabLst/>
-              <a:defRPr sz="4400" b="0" i="0" u="none" strike="noStrike" cap="none" spc="0" baseline="0">
-                <a:ln>
-                  <a:noFill/>
-                </a:ln>
-                <a:solidFill>
-                  <a:srgbClr val="000000"/>
-                </a:solidFill>
-                <a:uFillTx/>
-                <a:latin typeface="+mj-lt"/>
-                <a:ea typeface="+mj-ea"/>
-                <a:cs typeface="+mj-cs"/>
-                <a:sym typeface="Calibri"/>
-              </a:defRPr>
-            </a:lvl7pPr>
-            <a:lvl8pPr marL="0" marR="0" indent="0" algn="ctr" defTabSz="457200" rtl="0" latinLnBrk="0">
-              <a:lnSpc>
-                <a:spcPct val="100000"/>
-              </a:lnSpc>
-              <a:spcBef>
-                <a:spcPts val="0"/>
-              </a:spcBef>
-              <a:spcAft>
-                <a:spcPts val="0"/>
-              </a:spcAft>
-              <a:buClrTx/>
-              <a:buSzTx/>
-              <a:buFontTx/>
-              <a:buNone/>
-              <a:tabLst/>
-              <a:defRPr sz="4400" b="0" i="0" u="none" strike="noStrike" cap="none" spc="0" baseline="0">
-                <a:ln>
-                  <a:noFill/>
-                </a:ln>
-                <a:solidFill>
-                  <a:srgbClr val="000000"/>
-                </a:solidFill>
-                <a:uFillTx/>
-                <a:latin typeface="+mj-lt"/>
-                <a:ea typeface="+mj-ea"/>
-                <a:cs typeface="+mj-cs"/>
-                <a:sym typeface="Calibri"/>
-              </a:defRPr>
-            </a:lvl8pPr>
-            <a:lvl9pPr marL="0" marR="0" indent="0" algn="ctr" defTabSz="457200" rtl="0" latinLnBrk="0">
-              <a:lnSpc>
-                <a:spcPct val="100000"/>
-              </a:lnSpc>
-              <a:spcBef>
-                <a:spcPts val="0"/>
-              </a:spcBef>
-              <a:spcAft>
-                <a:spcPts val="0"/>
-              </a:spcAft>
-              <a:buClrTx/>
-              <a:buSzTx/>
-              <a:buFontTx/>
-              <a:buNone/>
-              <a:tabLst/>
-              <a:defRPr sz="4400" b="0" i="0" u="none" strike="noStrike" cap="none" spc="0" baseline="0">
-                <a:ln>
-                  <a:noFill/>
-                </a:ln>
-                <a:solidFill>
-                  <a:srgbClr val="000000"/>
-                </a:solidFill>
-                <a:uFillTx/>
-                <a:latin typeface="+mj-lt"/>
-                <a:ea typeface="+mj-ea"/>
-                <a:cs typeface="+mj-cs"/>
-                <a:sym typeface="Calibri"/>
-              </a:defRPr>
-            </a:lvl9pPr>
-          </a:lstStyle>
-          <a:p>
-            <a:pPr algn="l" defTabSz="265175" hangingPunct="1">
-              <a:defRPr sz="2262">
-                <a:solidFill>
-                  <a:srgbClr val="FFFFFF"/>
-                </a:solidFill>
-              </a:defRPr>
-            </a:pPr>
-            <a:r>
-              <a:rPr lang="pt-BR" sz="2000" b="1" dirty="0">
-                <a:solidFill>
-                  <a:schemeClr val="bg1"/>
-                </a:solidFill>
-              </a:rPr>
-              <a:t>Professor: </a:t>
-            </a:r>
-            <a:r>
-              <a:rPr lang="pt-BR" sz="2000" b="1" dirty="0" err="1">
-                <a:solidFill>
-                  <a:schemeClr val="bg1"/>
-                </a:solidFill>
-              </a:rPr>
-              <a:t>MSc</a:t>
-            </a:r>
-            <a:r>
-              <a:rPr lang="pt-BR" sz="2000" b="1" dirty="0">
-                <a:solidFill>
-                  <a:schemeClr val="bg1"/>
-                </a:solidFill>
-              </a:rPr>
-              <a:t> Heleno Cardoso </a:t>
-            </a:r>
-          </a:p>
-        </p:txBody>
-      </p:sp>
-    </p:spTree>
-    <p:extLst>
-      <p:ext uri="{BB962C8B-B14F-4D97-AF65-F5344CB8AC3E}">
-        <p14:creationId xmlns:p14="http://schemas.microsoft.com/office/powerpoint/2010/main" val="1100631195"/>
       </p:ext>
     </p:extLst>
   </p:cSld>
@@ -10548,6 +11047,12 @@
 </file>
 
 <file path=customXml/item1.xml><?xml version="1.0" encoding="utf-8"?>
+<p:properties xmlns:p="http://schemas.microsoft.com/office/2006/metadata/properties" xmlns:xsi="http://www.w3.org/2001/XMLSchema-instance" xmlns:pc="http://schemas.microsoft.com/office/infopath/2007/PartnerControls">
+  <documentManagement/>
+</p:properties>
+</file>
+
+<file path=customXml/item2.xml><?xml version="1.0" encoding="utf-8"?>
 <ct:contentTypeSchema xmlns:ct="http://schemas.microsoft.com/office/2006/metadata/contentType" xmlns:ma="http://schemas.microsoft.com/office/2006/metadata/properties/metaAttributes" ct:_="" ma:_="" ma:contentTypeName="Documento" ma:contentTypeID="0x010100E7E326A6FBD7C948AAF887265A2DB080" ma:contentTypeVersion="13" ma:contentTypeDescription="Crie um novo documento." ma:contentTypeScope="" ma:versionID="5629727caf6964b78819cfb788ada473">
   <xsd:schema xmlns:xsd="http://www.w3.org/2001/XMLSchema" xmlns:xs="http://www.w3.org/2001/XMLSchema" xmlns:p="http://schemas.microsoft.com/office/2006/metadata/properties" xmlns:ns2="bab2302b-9cf7-40b9-b316-803bc24ea342" xmlns:ns3="c298cbf6-df3b-44f4-88ee-2b3d9158f680" targetNamespace="http://schemas.microsoft.com/office/2006/metadata/properties" ma:root="true" ma:fieldsID="929990cc5bdd3bebd2af3f9d94cdeeec" ns2:_="" ns3:_="">
     <xsd:import namespace="bab2302b-9cf7-40b9-b316-803bc24ea342"/>
@@ -10770,12 +11275,6 @@
 </ct:contentTypeSchema>
 </file>
 
-<file path=customXml/item2.xml><?xml version="1.0" encoding="utf-8"?>
-<p:properties xmlns:p="http://schemas.microsoft.com/office/2006/metadata/properties" xmlns:xsi="http://www.w3.org/2001/XMLSchema-instance" xmlns:pc="http://schemas.microsoft.com/office/infopath/2007/PartnerControls">
-  <documentManagement/>
-</p:properties>
-</file>
-
 <file path=customXml/item3.xml><?xml version="1.0" encoding="utf-8"?>
 <?mso-contentType ?>
 <FormTemplates xmlns="http://schemas.microsoft.com/sharepoint/v3/contenttype/forms">
@@ -10786,6 +11285,15 @@
 </file>
 
 <file path=customXml/itemProps1.xml><?xml version="1.0" encoding="utf-8"?>
+<ds:datastoreItem xmlns:ds="http://schemas.openxmlformats.org/officeDocument/2006/customXml" ds:itemID="{961A30F4-F1EA-4F98-A164-76D337EE5565}">
+  <ds:schemaRefs>
+    <ds:schemaRef ds:uri="http://schemas.microsoft.com/office/2006/metadata/properties"/>
+    <ds:schemaRef ds:uri="http://schemas.microsoft.com/office/infopath/2007/PartnerControls"/>
+  </ds:schemaRefs>
+</ds:datastoreItem>
+</file>
+
+<file path=customXml/itemProps2.xml><?xml version="1.0" encoding="utf-8"?>
 <ds:datastoreItem xmlns:ds="http://schemas.openxmlformats.org/officeDocument/2006/customXml" ds:itemID="{6A7BB859-CC6B-497C-9B96-0A0D80ADCD36}">
   <ds:schemaRefs>
     <ds:schemaRef ds:uri="http://schemas.microsoft.com/office/2006/metadata/contentType"/>
@@ -10804,15 +11312,6 @@
 </ds:datastoreItem>
 </file>
 
-<file path=customXml/itemProps2.xml><?xml version="1.0" encoding="utf-8"?>
-<ds:datastoreItem xmlns:ds="http://schemas.openxmlformats.org/officeDocument/2006/customXml" ds:itemID="{961A30F4-F1EA-4F98-A164-76D337EE5565}">
-  <ds:schemaRefs>
-    <ds:schemaRef ds:uri="http://schemas.microsoft.com/office/2006/metadata/properties"/>
-    <ds:schemaRef ds:uri="http://schemas.microsoft.com/office/infopath/2007/PartnerControls"/>
-  </ds:schemaRefs>
-</ds:datastoreItem>
-</file>
-
 <file path=customXml/itemProps3.xml><?xml version="1.0" encoding="utf-8"?>
 <ds:datastoreItem xmlns:ds="http://schemas.openxmlformats.org/officeDocument/2006/customXml" ds:itemID="{AED456AD-07D2-43E3-AD57-2C9049066662}">
   <ds:schemaRefs>

</xml_diff>

<commit_message>
ajuste site netlify 31102023
</commit_message>
<xml_diff>
--- a/01 Classes/Aula03- Internet HTML - Parte 2.pptx
+++ b/01 Classes/Aula03- Internet HTML - Parte 2.pptx
@@ -3959,7 +3959,7 @@
           </a:ln>
           <a:extLst>
             <a:ext uri="{C572A759-6A51-4108-AA02-DFA0A04FC94B}">
-              <ma14:wrappingTextBoxFlag xmlns="" xmlns:ma14="http://schemas.microsoft.com/office/mac/drawingml/2011/main" val="1"/>
+              <ma14:wrappingTextBoxFlag xmlns:ma14="http://schemas.microsoft.com/office/mac/drawingml/2011/main" xmlns="" val="1"/>
             </a:ext>
           </a:extLst>
         </p:spPr>
@@ -4008,7 +4008,7 @@
           </a:ln>
           <a:extLst>
             <a:ext uri="{C572A759-6A51-4108-AA02-DFA0A04FC94B}">
-              <ma14:wrappingTextBoxFlag xmlns="" xmlns:ma14="http://schemas.microsoft.com/office/mac/drawingml/2011/main" val="1"/>
+              <ma14:wrappingTextBoxFlag xmlns:ma14="http://schemas.microsoft.com/office/mac/drawingml/2011/main" xmlns="" val="1"/>
             </a:ext>
           </a:extLst>
         </p:spPr>
@@ -4979,7 +4979,7 @@
           </a:ln>
           <a:extLst>
             <a:ext uri="{C572A759-6A51-4108-AA02-DFA0A04FC94B}">
-              <ma14:wrappingTextBoxFlag xmlns="" xmlns:ma14="http://schemas.microsoft.com/office/mac/drawingml/2011/main" val="1"/>
+              <ma14:wrappingTextBoxFlag xmlns:ma14="http://schemas.microsoft.com/office/mac/drawingml/2011/main" xmlns="" val="1"/>
             </a:ext>
           </a:extLst>
         </p:spPr>
@@ -5296,7 +5296,7 @@
           </a:ln>
           <a:extLst>
             <a:ext uri="{C572A759-6A51-4108-AA02-DFA0A04FC94B}">
-              <ma14:wrappingTextBoxFlag xmlns="" xmlns:ma14="http://schemas.microsoft.com/office/mac/drawingml/2011/main" val="1"/>
+              <ma14:wrappingTextBoxFlag xmlns:ma14="http://schemas.microsoft.com/office/mac/drawingml/2011/main" xmlns="" val="1"/>
             </a:ext>
           </a:extLst>
         </p:spPr>
@@ -5655,7 +5655,7 @@
           </a:ln>
           <a:extLst>
             <a:ext uri="{C572A759-6A51-4108-AA02-DFA0A04FC94B}">
-              <ma14:wrappingTextBoxFlag xmlns="" xmlns:ma14="http://schemas.microsoft.com/office/mac/drawingml/2011/main" val="1"/>
+              <ma14:wrappingTextBoxFlag xmlns:ma14="http://schemas.microsoft.com/office/mac/drawingml/2011/main" xmlns="" val="1"/>
             </a:ext>
           </a:extLst>
         </p:spPr>
@@ -5972,7 +5972,7 @@
           </a:ln>
           <a:extLst>
             <a:ext uri="{C572A759-6A51-4108-AA02-DFA0A04FC94B}">
-              <ma14:wrappingTextBoxFlag xmlns="" xmlns:ma14="http://schemas.microsoft.com/office/mac/drawingml/2011/main" val="1"/>
+              <ma14:wrappingTextBoxFlag xmlns:ma14="http://schemas.microsoft.com/office/mac/drawingml/2011/main" xmlns="" val="1"/>
             </a:ext>
           </a:extLst>
         </p:spPr>
@@ -6336,7 +6336,7 @@
           </a:ln>
           <a:extLst>
             <a:ext uri="{C572A759-6A51-4108-AA02-DFA0A04FC94B}">
-              <ma14:wrappingTextBoxFlag xmlns="" xmlns:ma14="http://schemas.microsoft.com/office/mac/drawingml/2011/main" val="1"/>
+              <ma14:wrappingTextBoxFlag xmlns:ma14="http://schemas.microsoft.com/office/mac/drawingml/2011/main" xmlns="" val="1"/>
             </a:ext>
           </a:extLst>
         </p:spPr>
@@ -6653,7 +6653,7 @@
           </a:ln>
           <a:extLst>
             <a:ext uri="{C572A759-6A51-4108-AA02-DFA0A04FC94B}">
-              <ma14:wrappingTextBoxFlag xmlns="" xmlns:ma14="http://schemas.microsoft.com/office/mac/drawingml/2011/main" val="1"/>
+              <ma14:wrappingTextBoxFlag xmlns:ma14="http://schemas.microsoft.com/office/mac/drawingml/2011/main" xmlns="" val="1"/>
             </a:ext>
           </a:extLst>
         </p:spPr>
@@ -7242,20 +7242,18 @@
               <a:t>	</a:t>
             </a:r>
             <a:r>
-              <a:rPr lang="pt-BR" sz="2400" dirty="0">
+              <a:rPr lang="pt-BR" sz="2400">
                 <a:hlinkClick r:id="rId3"/>
               </a:rPr>
-              <a:t>https://candid-tulumba-3b31b0.netlify.app</a:t>
-            </a:r>
-            <a:r>
-              <a:rPr lang="pt-BR" sz="2400" dirty="0">
-                <a:hlinkClick r:id="rId3"/>
-              </a:rPr>
-              <a:t>/</a:t>
+              <a:t>https://leonardonoteatro.netlify.app/</a:t>
+            </a:r>
+            <a:r>
+              <a:rPr lang="pt-BR" sz="2400"/>
+              <a:t> </a:t>
             </a:r>
             <a:r>
               <a:rPr lang="pt-BR" sz="2400" dirty="0"/>
-              <a:t> (</a:t>
+              <a:t>(</a:t>
             </a:r>
             <a:r>
               <a:rPr lang="pt-BR" sz="2400" b="1" dirty="0"/>
@@ -11047,12 +11045,6 @@
 </file>
 
 <file path=customXml/item1.xml><?xml version="1.0" encoding="utf-8"?>
-<p:properties xmlns:p="http://schemas.microsoft.com/office/2006/metadata/properties" xmlns:xsi="http://www.w3.org/2001/XMLSchema-instance" xmlns:pc="http://schemas.microsoft.com/office/infopath/2007/PartnerControls">
-  <documentManagement/>
-</p:properties>
-</file>
-
-<file path=customXml/item2.xml><?xml version="1.0" encoding="utf-8"?>
 <ct:contentTypeSchema xmlns:ct="http://schemas.microsoft.com/office/2006/metadata/contentType" xmlns:ma="http://schemas.microsoft.com/office/2006/metadata/properties/metaAttributes" ct:_="" ma:_="" ma:contentTypeName="Documento" ma:contentTypeID="0x010100E7E326A6FBD7C948AAF887265A2DB080" ma:contentTypeVersion="13" ma:contentTypeDescription="Crie um novo documento." ma:contentTypeScope="" ma:versionID="5629727caf6964b78819cfb788ada473">
   <xsd:schema xmlns:xsd="http://www.w3.org/2001/XMLSchema" xmlns:xs="http://www.w3.org/2001/XMLSchema" xmlns:p="http://schemas.microsoft.com/office/2006/metadata/properties" xmlns:ns2="bab2302b-9cf7-40b9-b316-803bc24ea342" xmlns:ns3="c298cbf6-df3b-44f4-88ee-2b3d9158f680" targetNamespace="http://schemas.microsoft.com/office/2006/metadata/properties" ma:root="true" ma:fieldsID="929990cc5bdd3bebd2af3f9d94cdeeec" ns2:_="" ns3:_="">
     <xsd:import namespace="bab2302b-9cf7-40b9-b316-803bc24ea342"/>
@@ -11275,6 +11267,12 @@
 </ct:contentTypeSchema>
 </file>
 
+<file path=customXml/item2.xml><?xml version="1.0" encoding="utf-8"?>
+<p:properties xmlns:p="http://schemas.microsoft.com/office/2006/metadata/properties" xmlns:xsi="http://www.w3.org/2001/XMLSchema-instance" xmlns:pc="http://schemas.microsoft.com/office/infopath/2007/PartnerControls">
+  <documentManagement/>
+</p:properties>
+</file>
+
 <file path=customXml/item3.xml><?xml version="1.0" encoding="utf-8"?>
 <?mso-contentType ?>
 <FormTemplates xmlns="http://schemas.microsoft.com/sharepoint/v3/contenttype/forms">
@@ -11285,15 +11283,6 @@
 </file>
 
 <file path=customXml/itemProps1.xml><?xml version="1.0" encoding="utf-8"?>
-<ds:datastoreItem xmlns:ds="http://schemas.openxmlformats.org/officeDocument/2006/customXml" ds:itemID="{961A30F4-F1EA-4F98-A164-76D337EE5565}">
-  <ds:schemaRefs>
-    <ds:schemaRef ds:uri="http://schemas.microsoft.com/office/2006/metadata/properties"/>
-    <ds:schemaRef ds:uri="http://schemas.microsoft.com/office/infopath/2007/PartnerControls"/>
-  </ds:schemaRefs>
-</ds:datastoreItem>
-</file>
-
-<file path=customXml/itemProps2.xml><?xml version="1.0" encoding="utf-8"?>
 <ds:datastoreItem xmlns:ds="http://schemas.openxmlformats.org/officeDocument/2006/customXml" ds:itemID="{6A7BB859-CC6B-497C-9B96-0A0D80ADCD36}">
   <ds:schemaRefs>
     <ds:schemaRef ds:uri="http://schemas.microsoft.com/office/2006/metadata/contentType"/>
@@ -11312,6 +11301,15 @@
 </ds:datastoreItem>
 </file>
 
+<file path=customXml/itemProps2.xml><?xml version="1.0" encoding="utf-8"?>
+<ds:datastoreItem xmlns:ds="http://schemas.openxmlformats.org/officeDocument/2006/customXml" ds:itemID="{961A30F4-F1EA-4F98-A164-76D337EE5565}">
+  <ds:schemaRefs>
+    <ds:schemaRef ds:uri="http://schemas.microsoft.com/office/2006/metadata/properties"/>
+    <ds:schemaRef ds:uri="http://schemas.microsoft.com/office/infopath/2007/PartnerControls"/>
+  </ds:schemaRefs>
+</ds:datastoreItem>
+</file>
+
 <file path=customXml/itemProps3.xml><?xml version="1.0" encoding="utf-8"?>
 <ds:datastoreItem xmlns:ds="http://schemas.openxmlformats.org/officeDocument/2006/customXml" ds:itemID="{AED456AD-07D2-43E3-AD57-2C9049066662}">
   <ds:schemaRefs>

</xml_diff>

<commit_message>
ajustes site netlify 31102023
</commit_message>
<xml_diff>
--- a/01 Classes/Aula03- Internet HTML - Parte 2.pptx
+++ b/01 Classes/Aula03- Internet HTML - Parte 2.pptx
@@ -3959,7 +3959,7 @@
           </a:ln>
           <a:extLst>
             <a:ext uri="{C572A759-6A51-4108-AA02-DFA0A04FC94B}">
-              <ma14:wrappingTextBoxFlag xmlns:ma14="http://schemas.microsoft.com/office/mac/drawingml/2011/main" xmlns="" val="1"/>
+              <ma14:wrappingTextBoxFlag xmlns="" xmlns:ma14="http://schemas.microsoft.com/office/mac/drawingml/2011/main" val="1"/>
             </a:ext>
           </a:extLst>
         </p:spPr>
@@ -4008,7 +4008,7 @@
           </a:ln>
           <a:extLst>
             <a:ext uri="{C572A759-6A51-4108-AA02-DFA0A04FC94B}">
-              <ma14:wrappingTextBoxFlag xmlns:ma14="http://schemas.microsoft.com/office/mac/drawingml/2011/main" xmlns="" val="1"/>
+              <ma14:wrappingTextBoxFlag xmlns="" xmlns:ma14="http://schemas.microsoft.com/office/mac/drawingml/2011/main" val="1"/>
             </a:ext>
           </a:extLst>
         </p:spPr>
@@ -4979,7 +4979,7 @@
           </a:ln>
           <a:extLst>
             <a:ext uri="{C572A759-6A51-4108-AA02-DFA0A04FC94B}">
-              <ma14:wrappingTextBoxFlag xmlns:ma14="http://schemas.microsoft.com/office/mac/drawingml/2011/main" xmlns="" val="1"/>
+              <ma14:wrappingTextBoxFlag xmlns="" xmlns:ma14="http://schemas.microsoft.com/office/mac/drawingml/2011/main" val="1"/>
             </a:ext>
           </a:extLst>
         </p:spPr>
@@ -5296,7 +5296,7 @@
           </a:ln>
           <a:extLst>
             <a:ext uri="{C572A759-6A51-4108-AA02-DFA0A04FC94B}">
-              <ma14:wrappingTextBoxFlag xmlns:ma14="http://schemas.microsoft.com/office/mac/drawingml/2011/main" xmlns="" val="1"/>
+              <ma14:wrappingTextBoxFlag xmlns="" xmlns:ma14="http://schemas.microsoft.com/office/mac/drawingml/2011/main" val="1"/>
             </a:ext>
           </a:extLst>
         </p:spPr>
@@ -5655,7 +5655,7 @@
           </a:ln>
           <a:extLst>
             <a:ext uri="{C572A759-6A51-4108-AA02-DFA0A04FC94B}">
-              <ma14:wrappingTextBoxFlag xmlns:ma14="http://schemas.microsoft.com/office/mac/drawingml/2011/main" xmlns="" val="1"/>
+              <ma14:wrappingTextBoxFlag xmlns="" xmlns:ma14="http://schemas.microsoft.com/office/mac/drawingml/2011/main" val="1"/>
             </a:ext>
           </a:extLst>
         </p:spPr>
@@ -5972,7 +5972,7 @@
           </a:ln>
           <a:extLst>
             <a:ext uri="{C572A759-6A51-4108-AA02-DFA0A04FC94B}">
-              <ma14:wrappingTextBoxFlag xmlns:ma14="http://schemas.microsoft.com/office/mac/drawingml/2011/main" xmlns="" val="1"/>
+              <ma14:wrappingTextBoxFlag xmlns="" xmlns:ma14="http://schemas.microsoft.com/office/mac/drawingml/2011/main" val="1"/>
             </a:ext>
           </a:extLst>
         </p:spPr>
@@ -6336,7 +6336,7 @@
           </a:ln>
           <a:extLst>
             <a:ext uri="{C572A759-6A51-4108-AA02-DFA0A04FC94B}">
-              <ma14:wrappingTextBoxFlag xmlns:ma14="http://schemas.microsoft.com/office/mac/drawingml/2011/main" xmlns="" val="1"/>
+              <ma14:wrappingTextBoxFlag xmlns="" xmlns:ma14="http://schemas.microsoft.com/office/mac/drawingml/2011/main" val="1"/>
             </a:ext>
           </a:extLst>
         </p:spPr>
@@ -6653,7 +6653,7 @@
           </a:ln>
           <a:extLst>
             <a:ext uri="{C572A759-6A51-4108-AA02-DFA0A04FC94B}">
-              <ma14:wrappingTextBoxFlag xmlns:ma14="http://schemas.microsoft.com/office/mac/drawingml/2011/main" xmlns="" val="1"/>
+              <ma14:wrappingTextBoxFlag xmlns="" xmlns:ma14="http://schemas.microsoft.com/office/mac/drawingml/2011/main" val="1"/>
             </a:ext>
           </a:extLst>
         </p:spPr>
@@ -7415,6 +7415,32 @@
               </a:rPr>
               <a:t>VSCode</a:t>
             </a:r>
+            <a:r>
+              <a:rPr lang="pt-BR" sz="2200" b="1" dirty="0">
+                <a:solidFill>
+                  <a:srgbClr val="FF0000"/>
+                </a:solidFill>
+              </a:rPr>
+              <a:t> - </a:t>
+            </a:r>
+            <a:r>
+              <a:rPr lang="pt-BR" sz="2200" b="1" dirty="0">
+                <a:solidFill>
+                  <a:schemeClr val="tx1"/>
+                </a:solidFill>
+              </a:rPr>
+              <a:t>Estudo</a:t>
+            </a:r>
+            <a:r>
+              <a:rPr lang="pt-BR" sz="2200" b="1" dirty="0"/>
+              <a:t>: </a:t>
+            </a:r>
+            <a:r>
+              <a:rPr lang="pt-BR" sz="2200" dirty="0">
+                <a:hlinkClick r:id="rId2"/>
+              </a:rPr>
+              <a:t>https://www.w3schools.com/html/</a:t>
+            </a:r>
             <a:endParaRPr lang="pt-BR" sz="2200" b="1" dirty="0">
               <a:solidFill>
                 <a:srgbClr val="FF0000"/>
@@ -7423,6 +7449,10 @@
           </a:p>
           <a:p>
             <a:pPr algn="just"/>
+            <a:endParaRPr lang="pt-BR" sz="2200" dirty="0"/>
+          </a:p>
+          <a:p>
+            <a:pPr algn="just"/>
             <a:r>
               <a:rPr lang="pt-BR" sz="2200" dirty="0"/>
               <a:t>=&gt; </a:t>
@@ -7468,7 +7498,7 @@
             </a:r>
             <a:r>
               <a:rPr lang="pt-BR" sz="2200" dirty="0" err="1"/>
-              <a:t>tr</a:t>
+              <a:t>hr</a:t>
             </a:r>
             <a:r>
               <a:rPr lang="pt-BR" sz="2200" dirty="0"/>
@@ -7496,34 +7526,14 @@
             </a:r>
             <a:r>
               <a:rPr lang="pt-BR" sz="2200" dirty="0"/>
-              <a:t>/li; </a:t>
+              <a:t>/li;</a:t>
             </a:r>
           </a:p>
           <a:p>
             <a:pPr algn="just"/>
             <a:r>
               <a:rPr lang="pt-BR" sz="2200" dirty="0"/>
-              <a:t>	2. a/</a:t>
-            </a:r>
-            <a:r>
-              <a:rPr lang="pt-BR" sz="2200" b="1" dirty="0" err="1">
-                <a:solidFill>
-                  <a:srgbClr val="FF0000"/>
-                </a:solidFill>
-              </a:rPr>
-              <a:t>href</a:t>
-            </a:r>
-            <a:r>
-              <a:rPr lang="pt-BR" sz="2200" b="1" dirty="0">
-                <a:solidFill>
-                  <a:srgbClr val="FF0000"/>
-                </a:solidFill>
-              </a:rPr>
-              <a:t>/target</a:t>
-            </a:r>
-            <a:r>
-              <a:rPr lang="pt-BR" sz="2200" dirty="0"/>
-              <a:t>; </a:t>
+              <a:t>	2. </a:t>
             </a:r>
             <a:r>
               <a:rPr lang="pt-BR" sz="2200" dirty="0" err="1"/>
@@ -7559,14 +7569,7 @@
             </a:r>
             <a:r>
               <a:rPr lang="pt-BR" sz="2200" dirty="0"/>
-              <a:t>; </a:t>
-            </a:r>
-          </a:p>
-          <a:p>
-            <a:pPr algn="just"/>
-            <a:r>
-              <a:rPr lang="pt-BR" sz="2200" dirty="0"/>
-              <a:t>	3. figure/</a:t>
+              <a:t>; figure/</a:t>
             </a:r>
             <a:r>
               <a:rPr lang="pt-BR" sz="2200" dirty="0" err="1"/>
@@ -7577,151 +7580,192 @@
               <a:t>/</a:t>
             </a:r>
             <a:r>
+              <a:rPr lang="pt-BR" sz="2200" b="1" dirty="0" err="1">
+                <a:solidFill>
+                  <a:srgbClr val="FF0000"/>
+                </a:solidFill>
+              </a:rPr>
+              <a:t>src</a:t>
+            </a:r>
+            <a:r>
+              <a:rPr lang="pt-BR" sz="2200" b="1" dirty="0">
+                <a:solidFill>
+                  <a:srgbClr val="FF0000"/>
+                </a:solidFill>
+              </a:rPr>
+              <a:t>/</a:t>
+            </a:r>
+            <a:r>
+              <a:rPr lang="pt-BR" sz="2200" b="1" dirty="0" err="1">
+                <a:solidFill>
+                  <a:srgbClr val="FF0000"/>
+                </a:solidFill>
+              </a:rPr>
+              <a:t>alt</a:t>
+            </a:r>
+            <a:r>
+              <a:rPr lang="pt-BR" sz="2200" dirty="0"/>
+              <a:t>/</a:t>
+            </a:r>
+            <a:r>
               <a:rPr lang="pt-BR" sz="2200" dirty="0" err="1"/>
               <a:t>figcaption</a:t>
             </a:r>
             <a:r>
               <a:rPr lang="pt-BR" sz="2200" dirty="0"/>
-              <a:t>; (</a:t>
-            </a:r>
-            <a:r>
-              <a:rPr lang="pt-BR" sz="2200" dirty="0">
-                <a:hlinkClick r:id="rId2"/>
-              </a:rPr>
-              <a:t>https://br.freepik.com/fotos/</a:t>
-            </a:r>
-            <a:r>
-              <a:rPr lang="pt-BR" sz="2200" dirty="0" err="1">
-                <a:hlinkClick r:id="rId2"/>
-              </a:rPr>
-              <a:t>cdn</a:t>
-            </a:r>
+              <a:t>;</a:t>
+            </a:r>
+          </a:p>
+          <a:p>
+            <a:pPr algn="just"/>
             <a:r>
               <a:rPr lang="pt-BR" sz="2200" dirty="0"/>
-              <a:t>)</a:t>
-            </a:r>
-          </a:p>
-          <a:p>
-            <a:pPr algn="just"/>
-            <a:r>
-              <a:rPr lang="pt-BR" sz="2200" dirty="0"/>
-              <a:t>	4. header; </a:t>
-            </a:r>
-            <a:r>
-              <a:rPr lang="pt-BR" sz="2200" dirty="0" err="1"/>
-              <a:t>footer</a:t>
-            </a:r>
-            <a:r>
-              <a:rPr lang="pt-BR" sz="2200" dirty="0"/>
-              <a:t>; </a:t>
-            </a:r>
-            <a:r>
-              <a:rPr lang="pt-BR" sz="2200" dirty="0" err="1"/>
-              <a:t>section</a:t>
-            </a:r>
-            <a:r>
-              <a:rPr lang="pt-BR" sz="2200" dirty="0"/>
-              <a:t>; </a:t>
-            </a:r>
-            <a:r>
-              <a:rPr lang="pt-BR" sz="2200" dirty="0" err="1"/>
-              <a:t>aside</a:t>
-            </a:r>
-            <a:r>
-              <a:rPr lang="pt-BR" sz="2200" dirty="0"/>
-              <a:t>; </a:t>
-            </a:r>
-            <a:r>
-              <a:rPr lang="pt-BR" sz="2200" dirty="0" err="1"/>
-              <a:t>div</a:t>
-            </a:r>
-            <a:r>
-              <a:rPr lang="pt-BR" sz="2200" dirty="0"/>
-              <a:t>; </a:t>
-            </a:r>
-          </a:p>
-          <a:p>
-            <a:pPr algn="just"/>
-            <a:r>
-              <a:rPr lang="pt-BR" sz="2200" dirty="0"/>
-              <a:t>	5. </a:t>
-            </a:r>
-            <a:r>
-              <a:rPr lang="pt-BR" sz="2200" dirty="0" err="1"/>
-              <a:t>nav</a:t>
-            </a:r>
-            <a:r>
-              <a:rPr lang="pt-BR" sz="2200" dirty="0"/>
-              <a:t>;</a:t>
-            </a:r>
-          </a:p>
-          <a:p>
-            <a:pPr algn="just"/>
-            <a:r>
-              <a:rPr lang="pt-BR" sz="2200" dirty="0"/>
-              <a:t>	6. </a:t>
-            </a:r>
-            <a:r>
-              <a:rPr lang="pt-BR" sz="2200" dirty="0" err="1"/>
-              <a:t>table</a:t>
-            </a:r>
-            <a:r>
-              <a:rPr lang="pt-BR" sz="2200" dirty="0"/>
-              <a:t> (</a:t>
+              <a:t> 	    (</a:t>
             </a:r>
             <a:r>
               <a:rPr lang="pt-BR" sz="2200" dirty="0">
                 <a:hlinkClick r:id="rId3"/>
               </a:rPr>
-              <a:t>https://www.tablesgenerator.com/</a:t>
+              <a:t>https://br.freepik.com/fotos/</a:t>
+            </a:r>
+            <a:r>
+              <a:rPr lang="pt-BR" sz="2200" dirty="0" err="1">
+                <a:hlinkClick r:id="rId3"/>
+              </a:rPr>
+              <a:t>cdn</a:t>
             </a:r>
             <a:r>
               <a:rPr lang="pt-BR" sz="2200" dirty="0"/>
-              <a:t>); </a:t>
+              <a:t>) </a:t>
             </a:r>
           </a:p>
           <a:p>
             <a:pPr algn="just"/>
             <a:r>
               <a:rPr lang="pt-BR" sz="2200" dirty="0"/>
-              <a:t>	7. </a:t>
+              <a:t>	3. a/</a:t>
+            </a:r>
+            <a:r>
+              <a:rPr lang="pt-BR" sz="2200" b="1" dirty="0" err="1">
+                <a:solidFill>
+                  <a:srgbClr val="FF0000"/>
+                </a:solidFill>
+              </a:rPr>
+              <a:t>href</a:t>
+            </a:r>
+            <a:r>
+              <a:rPr lang="pt-BR" sz="2200" b="1" dirty="0">
+                <a:solidFill>
+                  <a:srgbClr val="FF0000"/>
+                </a:solidFill>
+              </a:rPr>
+              <a:t>/target</a:t>
+            </a:r>
+            <a:r>
+              <a:rPr lang="pt-BR" sz="2200" dirty="0"/>
+              <a:t>;</a:t>
+            </a:r>
+          </a:p>
+          <a:p>
+            <a:pPr algn="just"/>
+            <a:r>
+              <a:rPr lang="pt-BR" sz="2200" dirty="0"/>
+              <a:t>	4. header; </a:t>
             </a:r>
             <a:r>
               <a:rPr lang="pt-BR" sz="2200" dirty="0" err="1"/>
-              <a:t>form</a:t>
+              <a:t>footer</a:t>
             </a:r>
             <a:r>
               <a:rPr lang="pt-BR" sz="2200" dirty="0"/>
-              <a:t>/</a:t>
-            </a:r>
-            <a:r>
-              <a:rPr lang="pt-BR" sz="2200" dirty="0">
-                <a:solidFill>
-                  <a:schemeClr val="tx1"/>
-                </a:solidFill>
-              </a:rPr>
-              <a:t>input.</a:t>
+              <a:t>; </a:t>
+            </a:r>
+            <a:r>
+              <a:rPr lang="pt-BR" sz="2200" dirty="0" err="1"/>
+              <a:t>section</a:t>
+            </a:r>
+            <a:r>
+              <a:rPr lang="pt-BR" sz="2200" dirty="0"/>
+              <a:t>; </a:t>
+            </a:r>
+            <a:r>
+              <a:rPr lang="pt-BR" sz="2200" dirty="0" err="1"/>
+              <a:t>aside</a:t>
+            </a:r>
+            <a:r>
+              <a:rPr lang="pt-BR" sz="2200" dirty="0"/>
+              <a:t>; </a:t>
+            </a:r>
+            <a:r>
+              <a:rPr lang="pt-BR" sz="2200" dirty="0" err="1"/>
+              <a:t>div</a:t>
+            </a:r>
+            <a:r>
+              <a:rPr lang="pt-BR" sz="2200" dirty="0"/>
+              <a:t>; </a:t>
             </a:r>
           </a:p>
           <a:p>
             <a:pPr algn="just"/>
-            <a:endParaRPr lang="pt-BR" sz="2200" dirty="0">
-              <a:solidFill>
-                <a:schemeClr val="tx1"/>
-              </a:solidFill>
-            </a:endParaRPr>
+            <a:r>
+              <a:rPr lang="pt-BR" sz="2200" dirty="0"/>
+              <a:t>	5. </a:t>
+            </a:r>
+            <a:r>
+              <a:rPr lang="pt-BR" sz="2200" dirty="0" err="1"/>
+              <a:t>nav</a:t>
+            </a:r>
+            <a:r>
+              <a:rPr lang="pt-BR" sz="2200" dirty="0"/>
+              <a:t>;</a:t>
+            </a:r>
           </a:p>
           <a:p>
             <a:pPr algn="just"/>
             <a:r>
-              <a:rPr lang="pt-BR" sz="2200" b="1" dirty="0"/>
-              <a:t>	Estudo: </a:t>
+              <a:rPr lang="pt-BR" sz="2200" dirty="0"/>
+              <a:t>	6. </a:t>
+            </a:r>
+            <a:r>
+              <a:rPr lang="pt-BR" sz="2200" dirty="0" err="1"/>
+              <a:t>table</a:t>
+            </a:r>
+            <a:r>
+              <a:rPr lang="pt-BR" sz="2200" dirty="0"/>
+              <a:t> (</a:t>
             </a:r>
             <a:r>
               <a:rPr lang="pt-BR" sz="2200" dirty="0">
                 <a:hlinkClick r:id="rId4"/>
               </a:rPr>
-              <a:t>https://www.w3schools.com/html/</a:t>
+              <a:t>https://www.tablesgenerator.com/</a:t>
+            </a:r>
+            <a:r>
+              <a:rPr lang="pt-BR" sz="2200" dirty="0"/>
+              <a:t>); </a:t>
+            </a:r>
+          </a:p>
+          <a:p>
+            <a:pPr algn="just"/>
+            <a:r>
+              <a:rPr lang="pt-BR" sz="2200" dirty="0"/>
+              <a:t>	7. </a:t>
+            </a:r>
+            <a:r>
+              <a:rPr lang="pt-BR" sz="2200" dirty="0" err="1"/>
+              <a:t>form</a:t>
+            </a:r>
+            <a:r>
+              <a:rPr lang="pt-BR" sz="2200" dirty="0"/>
+              <a:t>/</a:t>
+            </a:r>
+            <a:r>
+              <a:rPr lang="pt-BR" sz="2200" dirty="0">
+                <a:solidFill>
+                  <a:schemeClr val="tx1"/>
+                </a:solidFill>
+              </a:rPr>
+              <a:t>input.</a:t>
             </a:r>
             <a:endParaRPr lang="pt-BR" sz="2200" dirty="0"/>
           </a:p>
@@ -11045,6 +11089,12 @@
 </file>
 
 <file path=customXml/item1.xml><?xml version="1.0" encoding="utf-8"?>
+<p:properties xmlns:p="http://schemas.microsoft.com/office/2006/metadata/properties" xmlns:xsi="http://www.w3.org/2001/XMLSchema-instance" xmlns:pc="http://schemas.microsoft.com/office/infopath/2007/PartnerControls">
+  <documentManagement/>
+</p:properties>
+</file>
+
+<file path=customXml/item2.xml><?xml version="1.0" encoding="utf-8"?>
 <ct:contentTypeSchema xmlns:ct="http://schemas.microsoft.com/office/2006/metadata/contentType" xmlns:ma="http://schemas.microsoft.com/office/2006/metadata/properties/metaAttributes" ct:_="" ma:_="" ma:contentTypeName="Documento" ma:contentTypeID="0x010100E7E326A6FBD7C948AAF887265A2DB080" ma:contentTypeVersion="13" ma:contentTypeDescription="Crie um novo documento." ma:contentTypeScope="" ma:versionID="5629727caf6964b78819cfb788ada473">
   <xsd:schema xmlns:xsd="http://www.w3.org/2001/XMLSchema" xmlns:xs="http://www.w3.org/2001/XMLSchema" xmlns:p="http://schemas.microsoft.com/office/2006/metadata/properties" xmlns:ns2="bab2302b-9cf7-40b9-b316-803bc24ea342" xmlns:ns3="c298cbf6-df3b-44f4-88ee-2b3d9158f680" targetNamespace="http://schemas.microsoft.com/office/2006/metadata/properties" ma:root="true" ma:fieldsID="929990cc5bdd3bebd2af3f9d94cdeeec" ns2:_="" ns3:_="">
     <xsd:import namespace="bab2302b-9cf7-40b9-b316-803bc24ea342"/>
@@ -11267,12 +11317,6 @@
 </ct:contentTypeSchema>
 </file>
 
-<file path=customXml/item2.xml><?xml version="1.0" encoding="utf-8"?>
-<p:properties xmlns:p="http://schemas.microsoft.com/office/2006/metadata/properties" xmlns:xsi="http://www.w3.org/2001/XMLSchema-instance" xmlns:pc="http://schemas.microsoft.com/office/infopath/2007/PartnerControls">
-  <documentManagement/>
-</p:properties>
-</file>
-
 <file path=customXml/item3.xml><?xml version="1.0" encoding="utf-8"?>
 <?mso-contentType ?>
 <FormTemplates xmlns="http://schemas.microsoft.com/sharepoint/v3/contenttype/forms">
@@ -11283,6 +11327,15 @@
 </file>
 
 <file path=customXml/itemProps1.xml><?xml version="1.0" encoding="utf-8"?>
+<ds:datastoreItem xmlns:ds="http://schemas.openxmlformats.org/officeDocument/2006/customXml" ds:itemID="{961A30F4-F1EA-4F98-A164-76D337EE5565}">
+  <ds:schemaRefs>
+    <ds:schemaRef ds:uri="http://schemas.microsoft.com/office/2006/metadata/properties"/>
+    <ds:schemaRef ds:uri="http://schemas.microsoft.com/office/infopath/2007/PartnerControls"/>
+  </ds:schemaRefs>
+</ds:datastoreItem>
+</file>
+
+<file path=customXml/itemProps2.xml><?xml version="1.0" encoding="utf-8"?>
 <ds:datastoreItem xmlns:ds="http://schemas.openxmlformats.org/officeDocument/2006/customXml" ds:itemID="{6A7BB859-CC6B-497C-9B96-0A0D80ADCD36}">
   <ds:schemaRefs>
     <ds:schemaRef ds:uri="http://schemas.microsoft.com/office/2006/metadata/contentType"/>
@@ -11301,15 +11354,6 @@
 </ds:datastoreItem>
 </file>
 
-<file path=customXml/itemProps2.xml><?xml version="1.0" encoding="utf-8"?>
-<ds:datastoreItem xmlns:ds="http://schemas.openxmlformats.org/officeDocument/2006/customXml" ds:itemID="{961A30F4-F1EA-4F98-A164-76D337EE5565}">
-  <ds:schemaRefs>
-    <ds:schemaRef ds:uri="http://schemas.microsoft.com/office/2006/metadata/properties"/>
-    <ds:schemaRef ds:uri="http://schemas.microsoft.com/office/infopath/2007/PartnerControls"/>
-  </ds:schemaRefs>
-</ds:datastoreItem>
-</file>
-
 <file path=customXml/itemProps3.xml><?xml version="1.0" encoding="utf-8"?>
 <ds:datastoreItem xmlns:ds="http://schemas.openxmlformats.org/officeDocument/2006/customXml" ds:itemID="{AED456AD-07D2-43E3-AD57-2C9049066662}">
   <ds:schemaRefs>

</xml_diff>